<commit_message>
#13 update CD on signin/-signup
</commit_message>
<xml_diff>
--- a/docs/COMPONENT-DIAGRAM.pptx
+++ b/docs/COMPONENT-DIAGRAM.pptx
@@ -6,7 +6,7 @@
   </p:sldMasterIdLst>
   <p:sldIdLst>
     <p:sldId id="256" r:id="rId2"/>
-    <p:sldId id="258" r:id="rId3"/>
+    <p:sldId id="259" r:id="rId3"/>
   </p:sldIdLst>
   <p:sldSz cx="12192000" cy="6858000"/>
   <p:notesSz cx="6858000" cy="9144000"/>
@@ -105,6 +105,11 @@
       </a:defRPr>
     </a:lvl9pPr>
   </p:defaultTextStyle>
+  <p:extLst>
+    <p:ext uri="{EFAFB233-063F-42B5-8137-9DF3F51BA10A}">
+      <p15:sldGuideLst xmlns:p15="http://schemas.microsoft.com/office/powerpoint/2012/main"/>
+    </p:ext>
+  </p:extLst>
 </p:presentation>
 </file>
 
@@ -150,10 +155,9 @@
           </a:lstStyle>
           <a:p>
             <a:r>
-              <a:rPr lang="en-US" smtClean="0"/>
+              <a:rPr lang="en-US"/>
               <a:t>Click to edit Master title style</a:t>
             </a:r>
-            <a:endParaRPr lang="en-US"/>
           </a:p>
         </p:txBody>
       </p:sp>
@@ -215,10 +219,9 @@
           </a:lstStyle>
           <a:p>
             <a:r>
-              <a:rPr lang="en-US" smtClean="0"/>
+              <a:rPr lang="en-US"/>
               <a:t>Click to edit Master subtitle style</a:t>
             </a:r>
-            <a:endParaRPr lang="en-US"/>
           </a:p>
         </p:txBody>
       </p:sp>
@@ -239,7 +242,7 @@
           <a:p>
             <a:fld id="{28BE630F-C39C-4DB9-8258-0B48CA067079}" type="datetimeFigureOut">
               <a:rPr lang="en-US" smtClean="0"/>
-              <a:t>11/25/2021</a:t>
+              <a:t>11/28/2021</a:t>
             </a:fld>
             <a:endParaRPr lang="en-US"/>
           </a:p>
@@ -333,10 +336,9 @@
           <a:lstStyle/>
           <a:p>
             <a:r>
-              <a:rPr lang="en-US" smtClean="0"/>
+              <a:rPr lang="en-US"/>
               <a:t>Click to edit Master title style</a:t>
             </a:r>
-            <a:endParaRPr lang="en-US"/>
           </a:p>
         </p:txBody>
       </p:sp>
@@ -357,38 +359,37 @@
           <a:p>
             <a:pPr lvl="0"/>
             <a:r>
-              <a:rPr lang="en-US" smtClean="0"/>
+              <a:rPr lang="en-US"/>
               <a:t>Click to edit Master text styles</a:t>
             </a:r>
           </a:p>
           <a:p>
             <a:pPr lvl="1"/>
             <a:r>
-              <a:rPr lang="en-US" smtClean="0"/>
+              <a:rPr lang="en-US"/>
               <a:t>Second level</a:t>
             </a:r>
           </a:p>
           <a:p>
             <a:pPr lvl="2"/>
             <a:r>
-              <a:rPr lang="en-US" smtClean="0"/>
+              <a:rPr lang="en-US"/>
               <a:t>Third level</a:t>
             </a:r>
           </a:p>
           <a:p>
             <a:pPr lvl="3"/>
             <a:r>
-              <a:rPr lang="en-US" smtClean="0"/>
+              <a:rPr lang="en-US"/>
               <a:t>Fourth level</a:t>
             </a:r>
           </a:p>
           <a:p>
             <a:pPr lvl="4"/>
             <a:r>
-              <a:rPr lang="en-US" smtClean="0"/>
+              <a:rPr lang="en-US"/>
               <a:t>Fifth level</a:t>
             </a:r>
-            <a:endParaRPr lang="en-US"/>
           </a:p>
         </p:txBody>
       </p:sp>
@@ -409,7 +410,7 @@
           <a:p>
             <a:fld id="{28BE630F-C39C-4DB9-8258-0B48CA067079}" type="datetimeFigureOut">
               <a:rPr lang="en-US" smtClean="0"/>
-              <a:t>11/25/2021</a:t>
+              <a:t>11/28/2021</a:t>
             </a:fld>
             <a:endParaRPr lang="en-US"/>
           </a:p>
@@ -508,10 +509,9 @@
           <a:lstStyle/>
           <a:p>
             <a:r>
-              <a:rPr lang="en-US" smtClean="0"/>
+              <a:rPr lang="en-US"/>
               <a:t>Click to edit Master title style</a:t>
             </a:r>
-            <a:endParaRPr lang="en-US"/>
           </a:p>
         </p:txBody>
       </p:sp>
@@ -537,38 +537,37 @@
           <a:p>
             <a:pPr lvl="0"/>
             <a:r>
-              <a:rPr lang="en-US" smtClean="0"/>
+              <a:rPr lang="en-US"/>
               <a:t>Click to edit Master text styles</a:t>
             </a:r>
           </a:p>
           <a:p>
             <a:pPr lvl="1"/>
             <a:r>
-              <a:rPr lang="en-US" smtClean="0"/>
+              <a:rPr lang="en-US"/>
               <a:t>Second level</a:t>
             </a:r>
           </a:p>
           <a:p>
             <a:pPr lvl="2"/>
             <a:r>
-              <a:rPr lang="en-US" smtClean="0"/>
+              <a:rPr lang="en-US"/>
               <a:t>Third level</a:t>
             </a:r>
           </a:p>
           <a:p>
             <a:pPr lvl="3"/>
             <a:r>
-              <a:rPr lang="en-US" smtClean="0"/>
+              <a:rPr lang="en-US"/>
               <a:t>Fourth level</a:t>
             </a:r>
           </a:p>
           <a:p>
             <a:pPr lvl="4"/>
             <a:r>
-              <a:rPr lang="en-US" smtClean="0"/>
+              <a:rPr lang="en-US"/>
               <a:t>Fifth level</a:t>
             </a:r>
-            <a:endParaRPr lang="en-US"/>
           </a:p>
         </p:txBody>
       </p:sp>
@@ -589,7 +588,7 @@
           <a:p>
             <a:fld id="{28BE630F-C39C-4DB9-8258-0B48CA067079}" type="datetimeFigureOut">
               <a:rPr lang="en-US" smtClean="0"/>
-              <a:t>11/25/2021</a:t>
+              <a:t>11/28/2021</a:t>
             </a:fld>
             <a:endParaRPr lang="en-US"/>
           </a:p>
@@ -683,10 +682,9 @@
           <a:lstStyle/>
           <a:p>
             <a:r>
-              <a:rPr lang="en-US" smtClean="0"/>
+              <a:rPr lang="en-US"/>
               <a:t>Click to edit Master title style</a:t>
             </a:r>
-            <a:endParaRPr lang="en-US"/>
           </a:p>
         </p:txBody>
       </p:sp>
@@ -707,38 +705,37 @@
           <a:p>
             <a:pPr lvl="0"/>
             <a:r>
-              <a:rPr lang="en-US" smtClean="0"/>
+              <a:rPr lang="en-US"/>
               <a:t>Click to edit Master text styles</a:t>
             </a:r>
           </a:p>
           <a:p>
             <a:pPr lvl="1"/>
             <a:r>
-              <a:rPr lang="en-US" smtClean="0"/>
+              <a:rPr lang="en-US"/>
               <a:t>Second level</a:t>
             </a:r>
           </a:p>
           <a:p>
             <a:pPr lvl="2"/>
             <a:r>
-              <a:rPr lang="en-US" smtClean="0"/>
+              <a:rPr lang="en-US"/>
               <a:t>Third level</a:t>
             </a:r>
           </a:p>
           <a:p>
             <a:pPr lvl="3"/>
             <a:r>
-              <a:rPr lang="en-US" smtClean="0"/>
+              <a:rPr lang="en-US"/>
               <a:t>Fourth level</a:t>
             </a:r>
           </a:p>
           <a:p>
             <a:pPr lvl="4"/>
             <a:r>
-              <a:rPr lang="en-US" smtClean="0"/>
+              <a:rPr lang="en-US"/>
               <a:t>Fifth level</a:t>
             </a:r>
-            <a:endParaRPr lang="en-US"/>
           </a:p>
         </p:txBody>
       </p:sp>
@@ -759,7 +756,7 @@
           <a:p>
             <a:fld id="{28BE630F-C39C-4DB9-8258-0B48CA067079}" type="datetimeFigureOut">
               <a:rPr lang="en-US" smtClean="0"/>
-              <a:t>11/25/2021</a:t>
+              <a:t>11/28/2021</a:t>
             </a:fld>
             <a:endParaRPr lang="en-US"/>
           </a:p>
@@ -862,10 +859,9 @@
           </a:lstStyle>
           <a:p>
             <a:r>
-              <a:rPr lang="en-US" smtClean="0"/>
+              <a:rPr lang="en-US"/>
               <a:t>Click to edit Master title style</a:t>
             </a:r>
-            <a:endParaRPr lang="en-US"/>
           </a:p>
         </p:txBody>
       </p:sp>
@@ -982,7 +978,7 @@
           <a:p>
             <a:pPr lvl="0"/>
             <a:r>
-              <a:rPr lang="en-US" smtClean="0"/>
+              <a:rPr lang="en-US"/>
               <a:t>Click to edit Master text styles</a:t>
             </a:r>
           </a:p>
@@ -1005,7 +1001,7 @@
           <a:p>
             <a:fld id="{28BE630F-C39C-4DB9-8258-0B48CA067079}" type="datetimeFigureOut">
               <a:rPr lang="en-US" smtClean="0"/>
-              <a:t>11/25/2021</a:t>
+              <a:t>11/28/2021</a:t>
             </a:fld>
             <a:endParaRPr lang="en-US"/>
           </a:p>
@@ -1099,10 +1095,9 @@
           <a:lstStyle/>
           <a:p>
             <a:r>
-              <a:rPr lang="en-US" smtClean="0"/>
+              <a:rPr lang="en-US"/>
               <a:t>Click to edit Master title style</a:t>
             </a:r>
-            <a:endParaRPr lang="en-US"/>
           </a:p>
         </p:txBody>
       </p:sp>
@@ -1128,38 +1123,37 @@
           <a:p>
             <a:pPr lvl="0"/>
             <a:r>
-              <a:rPr lang="en-US" smtClean="0"/>
+              <a:rPr lang="en-US"/>
               <a:t>Click to edit Master text styles</a:t>
             </a:r>
           </a:p>
           <a:p>
             <a:pPr lvl="1"/>
             <a:r>
-              <a:rPr lang="en-US" smtClean="0"/>
+              <a:rPr lang="en-US"/>
               <a:t>Second level</a:t>
             </a:r>
           </a:p>
           <a:p>
             <a:pPr lvl="2"/>
             <a:r>
-              <a:rPr lang="en-US" smtClean="0"/>
+              <a:rPr lang="en-US"/>
               <a:t>Third level</a:t>
             </a:r>
           </a:p>
           <a:p>
             <a:pPr lvl="3"/>
             <a:r>
-              <a:rPr lang="en-US" smtClean="0"/>
+              <a:rPr lang="en-US"/>
               <a:t>Fourth level</a:t>
             </a:r>
           </a:p>
           <a:p>
             <a:pPr lvl="4"/>
             <a:r>
-              <a:rPr lang="en-US" smtClean="0"/>
+              <a:rPr lang="en-US"/>
               <a:t>Fifth level</a:t>
             </a:r>
-            <a:endParaRPr lang="en-US"/>
           </a:p>
         </p:txBody>
       </p:sp>
@@ -1185,38 +1179,37 @@
           <a:p>
             <a:pPr lvl="0"/>
             <a:r>
-              <a:rPr lang="en-US" smtClean="0"/>
+              <a:rPr lang="en-US"/>
               <a:t>Click to edit Master text styles</a:t>
             </a:r>
           </a:p>
           <a:p>
             <a:pPr lvl="1"/>
             <a:r>
-              <a:rPr lang="en-US" smtClean="0"/>
+              <a:rPr lang="en-US"/>
               <a:t>Second level</a:t>
             </a:r>
           </a:p>
           <a:p>
             <a:pPr lvl="2"/>
             <a:r>
-              <a:rPr lang="en-US" smtClean="0"/>
+              <a:rPr lang="en-US"/>
               <a:t>Third level</a:t>
             </a:r>
           </a:p>
           <a:p>
             <a:pPr lvl="3"/>
             <a:r>
-              <a:rPr lang="en-US" smtClean="0"/>
+              <a:rPr lang="en-US"/>
               <a:t>Fourth level</a:t>
             </a:r>
           </a:p>
           <a:p>
             <a:pPr lvl="4"/>
             <a:r>
-              <a:rPr lang="en-US" smtClean="0"/>
+              <a:rPr lang="en-US"/>
               <a:t>Fifth level</a:t>
             </a:r>
-            <a:endParaRPr lang="en-US"/>
           </a:p>
         </p:txBody>
       </p:sp>
@@ -1237,7 +1230,7 @@
           <a:p>
             <a:fld id="{28BE630F-C39C-4DB9-8258-0B48CA067079}" type="datetimeFigureOut">
               <a:rPr lang="en-US" smtClean="0"/>
-              <a:t>11/25/2021</a:t>
+              <a:t>11/28/2021</a:t>
             </a:fld>
             <a:endParaRPr lang="en-US"/>
           </a:p>
@@ -1336,10 +1329,9 @@
           <a:lstStyle/>
           <a:p>
             <a:r>
-              <a:rPr lang="en-US" smtClean="0"/>
+              <a:rPr lang="en-US"/>
               <a:t>Click to edit Master title style</a:t>
             </a:r>
-            <a:endParaRPr lang="en-US"/>
           </a:p>
         </p:txBody>
       </p:sp>
@@ -1402,7 +1394,7 @@
           <a:p>
             <a:pPr lvl="0"/>
             <a:r>
-              <a:rPr lang="en-US" smtClean="0"/>
+              <a:rPr lang="en-US"/>
               <a:t>Click to edit Master text styles</a:t>
             </a:r>
           </a:p>
@@ -1430,38 +1422,37 @@
           <a:p>
             <a:pPr lvl="0"/>
             <a:r>
-              <a:rPr lang="en-US" smtClean="0"/>
+              <a:rPr lang="en-US"/>
               <a:t>Click to edit Master text styles</a:t>
             </a:r>
           </a:p>
           <a:p>
             <a:pPr lvl="1"/>
             <a:r>
-              <a:rPr lang="en-US" smtClean="0"/>
+              <a:rPr lang="en-US"/>
               <a:t>Second level</a:t>
             </a:r>
           </a:p>
           <a:p>
             <a:pPr lvl="2"/>
             <a:r>
-              <a:rPr lang="en-US" smtClean="0"/>
+              <a:rPr lang="en-US"/>
               <a:t>Third level</a:t>
             </a:r>
           </a:p>
           <a:p>
             <a:pPr lvl="3"/>
             <a:r>
-              <a:rPr lang="en-US" smtClean="0"/>
+              <a:rPr lang="en-US"/>
               <a:t>Fourth level</a:t>
             </a:r>
           </a:p>
           <a:p>
             <a:pPr lvl="4"/>
             <a:r>
-              <a:rPr lang="en-US" smtClean="0"/>
+              <a:rPr lang="en-US"/>
               <a:t>Fifth level</a:t>
             </a:r>
-            <a:endParaRPr lang="en-US"/>
           </a:p>
         </p:txBody>
       </p:sp>
@@ -1524,7 +1515,7 @@
           <a:p>
             <a:pPr lvl="0"/>
             <a:r>
-              <a:rPr lang="en-US" smtClean="0"/>
+              <a:rPr lang="en-US"/>
               <a:t>Click to edit Master text styles</a:t>
             </a:r>
           </a:p>
@@ -1552,38 +1543,37 @@
           <a:p>
             <a:pPr lvl="0"/>
             <a:r>
-              <a:rPr lang="en-US" smtClean="0"/>
+              <a:rPr lang="en-US"/>
               <a:t>Click to edit Master text styles</a:t>
             </a:r>
           </a:p>
           <a:p>
             <a:pPr lvl="1"/>
             <a:r>
-              <a:rPr lang="en-US" smtClean="0"/>
+              <a:rPr lang="en-US"/>
               <a:t>Second level</a:t>
             </a:r>
           </a:p>
           <a:p>
             <a:pPr lvl="2"/>
             <a:r>
-              <a:rPr lang="en-US" smtClean="0"/>
+              <a:rPr lang="en-US"/>
               <a:t>Third level</a:t>
             </a:r>
           </a:p>
           <a:p>
             <a:pPr lvl="3"/>
             <a:r>
-              <a:rPr lang="en-US" smtClean="0"/>
+              <a:rPr lang="en-US"/>
               <a:t>Fourth level</a:t>
             </a:r>
           </a:p>
           <a:p>
             <a:pPr lvl="4"/>
             <a:r>
-              <a:rPr lang="en-US" smtClean="0"/>
+              <a:rPr lang="en-US"/>
               <a:t>Fifth level</a:t>
             </a:r>
-            <a:endParaRPr lang="en-US"/>
           </a:p>
         </p:txBody>
       </p:sp>
@@ -1604,7 +1594,7 @@
           <a:p>
             <a:fld id="{28BE630F-C39C-4DB9-8258-0B48CA067079}" type="datetimeFigureOut">
               <a:rPr lang="en-US" smtClean="0"/>
-              <a:t>11/25/2021</a:t>
+              <a:t>11/28/2021</a:t>
             </a:fld>
             <a:endParaRPr lang="en-US"/>
           </a:p>
@@ -1698,10 +1688,9 @@
           <a:lstStyle/>
           <a:p>
             <a:r>
-              <a:rPr lang="en-US" smtClean="0"/>
+              <a:rPr lang="en-US"/>
               <a:t>Click to edit Master title style</a:t>
             </a:r>
-            <a:endParaRPr lang="en-US"/>
           </a:p>
         </p:txBody>
       </p:sp>
@@ -1722,7 +1711,7 @@
           <a:p>
             <a:fld id="{28BE630F-C39C-4DB9-8258-0B48CA067079}" type="datetimeFigureOut">
               <a:rPr lang="en-US" smtClean="0"/>
-              <a:t>11/25/2021</a:t>
+              <a:t>11/28/2021</a:t>
             </a:fld>
             <a:endParaRPr lang="en-US"/>
           </a:p>
@@ -1817,7 +1806,7 @@
           <a:p>
             <a:fld id="{28BE630F-C39C-4DB9-8258-0B48CA067079}" type="datetimeFigureOut">
               <a:rPr lang="en-US" smtClean="0"/>
-              <a:t>11/25/2021</a:t>
+              <a:t>11/28/2021</a:t>
             </a:fld>
             <a:endParaRPr lang="en-US"/>
           </a:p>
@@ -1920,10 +1909,9 @@
           </a:lstStyle>
           <a:p>
             <a:r>
-              <a:rPr lang="en-US" smtClean="0"/>
+              <a:rPr lang="en-US"/>
               <a:t>Click to edit Master title style</a:t>
             </a:r>
-            <a:endParaRPr lang="en-US"/>
           </a:p>
         </p:txBody>
       </p:sp>
@@ -1977,38 +1965,37 @@
           <a:p>
             <a:pPr lvl="0"/>
             <a:r>
-              <a:rPr lang="en-US" smtClean="0"/>
+              <a:rPr lang="en-US"/>
               <a:t>Click to edit Master text styles</a:t>
             </a:r>
           </a:p>
           <a:p>
             <a:pPr lvl="1"/>
             <a:r>
-              <a:rPr lang="en-US" smtClean="0"/>
+              <a:rPr lang="en-US"/>
               <a:t>Second level</a:t>
             </a:r>
           </a:p>
           <a:p>
             <a:pPr lvl="2"/>
             <a:r>
-              <a:rPr lang="en-US" smtClean="0"/>
+              <a:rPr lang="en-US"/>
               <a:t>Third level</a:t>
             </a:r>
           </a:p>
           <a:p>
             <a:pPr lvl="3"/>
             <a:r>
-              <a:rPr lang="en-US" smtClean="0"/>
+              <a:rPr lang="en-US"/>
               <a:t>Fourth level</a:t>
             </a:r>
           </a:p>
           <a:p>
             <a:pPr lvl="4"/>
             <a:r>
-              <a:rPr lang="en-US" smtClean="0"/>
+              <a:rPr lang="en-US"/>
               <a:t>Fifth level</a:t>
             </a:r>
-            <a:endParaRPr lang="en-US"/>
           </a:p>
         </p:txBody>
       </p:sp>
@@ -2071,7 +2058,7 @@
           <a:p>
             <a:pPr lvl="0"/>
             <a:r>
-              <a:rPr lang="en-US" smtClean="0"/>
+              <a:rPr lang="en-US"/>
               <a:t>Click to edit Master text styles</a:t>
             </a:r>
           </a:p>
@@ -2094,7 +2081,7 @@
           <a:p>
             <a:fld id="{28BE630F-C39C-4DB9-8258-0B48CA067079}" type="datetimeFigureOut">
               <a:rPr lang="en-US" smtClean="0"/>
-              <a:t>11/25/2021</a:t>
+              <a:t>11/28/2021</a:t>
             </a:fld>
             <a:endParaRPr lang="en-US"/>
           </a:p>
@@ -2197,10 +2184,9 @@
           </a:lstStyle>
           <a:p>
             <a:r>
-              <a:rPr lang="en-US" smtClean="0"/>
+              <a:rPr lang="en-US"/>
               <a:t>Click to edit Master title style</a:t>
             </a:r>
-            <a:endParaRPr lang="en-US"/>
           </a:p>
         </p:txBody>
       </p:sp>
@@ -2324,7 +2310,7 @@
           <a:p>
             <a:pPr lvl="0"/>
             <a:r>
-              <a:rPr lang="en-US" smtClean="0"/>
+              <a:rPr lang="en-US"/>
               <a:t>Click to edit Master text styles</a:t>
             </a:r>
           </a:p>
@@ -2347,7 +2333,7 @@
           <a:p>
             <a:fld id="{28BE630F-C39C-4DB9-8258-0B48CA067079}" type="datetimeFigureOut">
               <a:rPr lang="en-US" smtClean="0"/>
-              <a:t>11/25/2021</a:t>
+              <a:t>11/28/2021</a:t>
             </a:fld>
             <a:endParaRPr lang="en-US"/>
           </a:p>
@@ -2456,10 +2442,9 @@
           <a:lstStyle/>
           <a:p>
             <a:r>
-              <a:rPr lang="en-US" smtClean="0"/>
+              <a:rPr lang="en-US"/>
               <a:t>Click to edit Master title style</a:t>
             </a:r>
-            <a:endParaRPr lang="en-US"/>
           </a:p>
         </p:txBody>
       </p:sp>
@@ -2490,38 +2475,37 @@
           <a:p>
             <a:pPr lvl="0"/>
             <a:r>
-              <a:rPr lang="en-US" smtClean="0"/>
+              <a:rPr lang="en-US"/>
               <a:t>Click to edit Master text styles</a:t>
             </a:r>
           </a:p>
           <a:p>
             <a:pPr lvl="1"/>
             <a:r>
-              <a:rPr lang="en-US" smtClean="0"/>
+              <a:rPr lang="en-US"/>
               <a:t>Second level</a:t>
             </a:r>
           </a:p>
           <a:p>
             <a:pPr lvl="2"/>
             <a:r>
-              <a:rPr lang="en-US" smtClean="0"/>
+              <a:rPr lang="en-US"/>
               <a:t>Third level</a:t>
             </a:r>
           </a:p>
           <a:p>
             <a:pPr lvl="3"/>
             <a:r>
-              <a:rPr lang="en-US" smtClean="0"/>
+              <a:rPr lang="en-US"/>
               <a:t>Fourth level</a:t>
             </a:r>
           </a:p>
           <a:p>
             <a:pPr lvl="4"/>
             <a:r>
-              <a:rPr lang="en-US" smtClean="0"/>
+              <a:rPr lang="en-US"/>
               <a:t>Fifth level</a:t>
             </a:r>
-            <a:endParaRPr lang="en-US"/>
           </a:p>
         </p:txBody>
       </p:sp>
@@ -2560,7 +2544,7 @@
           <a:p>
             <a:fld id="{28BE630F-C39C-4DB9-8258-0B48CA067079}" type="datetimeFigureOut">
               <a:rPr lang="en-US" smtClean="0"/>
-              <a:t>11/25/2021</a:t>
+              <a:t>11/28/2021</a:t>
             </a:fld>
             <a:endParaRPr lang="en-US"/>
           </a:p>
@@ -3222,47 +3206,20 @@
       </p:grpSpPr>
       <p:sp>
         <p:nvSpPr>
-          <p:cNvPr id="4" name="TextBox 3"/>
-          <p:cNvSpPr txBox="1"/>
-          <p:nvPr/>
-        </p:nvSpPr>
-        <p:spPr>
-          <a:xfrm>
-            <a:off x="1009380" y="479624"/>
-            <a:ext cx="639919" cy="303481"/>
-          </a:xfrm>
-          <a:prstGeom prst="rect">
-            <a:avLst/>
-          </a:prstGeom>
-          <a:noFill/>
-        </p:spPr>
-        <p:txBody>
-          <a:bodyPr wrap="none" rtlCol="0">
-            <a:spAutoFit/>
-          </a:bodyPr>
-          <a:lstStyle/>
-          <a:p>
-            <a:r>
-              <a:rPr lang="en-US" sz="1372" b="1" i="1" dirty="0">
-                <a:solidFill>
-                  <a:srgbClr val="FF0000"/>
-                </a:solidFill>
-              </a:rPr>
-              <a:t>&lt;app&gt;</a:t>
-            </a:r>
-          </a:p>
-        </p:txBody>
-      </p:sp>
-      <p:sp>
-        <p:nvSpPr>
-          <p:cNvPr id="5" name="Rounded Rectangle 4"/>
+          <p:cNvPr id="13" name="Rounded Rectangle 4">
+            <a:extLst>
+              <a:ext uri="{FF2B5EF4-FFF2-40B4-BE49-F238E27FC236}">
+                <a16:creationId xmlns:a16="http://schemas.microsoft.com/office/drawing/2014/main" id="{C0385D50-A6C5-442D-A3DA-351E391406A5}"/>
+              </a:ext>
+            </a:extLst>
+          </p:cNvPr>
           <p:cNvSpPr/>
           <p:nvPr/>
         </p:nvSpPr>
         <p:spPr>
           <a:xfrm>
-            <a:off x="523323" y="309043"/>
-            <a:ext cx="1650319" cy="1166483"/>
+            <a:off x="5343032" y="1083243"/>
+            <a:ext cx="2498173" cy="931510"/>
           </a:xfrm>
           <a:prstGeom prst="roundRect">
             <a:avLst/>
@@ -3302,14 +3259,20 @@
       </p:sp>
       <p:sp>
         <p:nvSpPr>
-          <p:cNvPr id="6" name="TextBox 5"/>
+          <p:cNvPr id="14" name="TextBox 13">
+            <a:extLst>
+              <a:ext uri="{FF2B5EF4-FFF2-40B4-BE49-F238E27FC236}">
+                <a16:creationId xmlns:a16="http://schemas.microsoft.com/office/drawing/2014/main" id="{38CFF590-FF10-463E-B856-7002EECB951D}"/>
+              </a:ext>
+            </a:extLst>
+          </p:cNvPr>
           <p:cNvSpPr txBox="1"/>
           <p:nvPr/>
         </p:nvSpPr>
         <p:spPr>
           <a:xfrm>
-            <a:off x="885053" y="892284"/>
-            <a:ext cx="926857" cy="303481"/>
+            <a:off x="1739725" y="1039785"/>
+            <a:ext cx="780983" cy="369332"/>
           </a:xfrm>
           <a:prstGeom prst="rect">
             <a:avLst/>
@@ -3323,67 +3286,7 @@
           <a:lstStyle/>
           <a:p>
             <a:r>
-              <a:rPr lang="en-US" sz="1372" dirty="0" smtClean="0"/>
-              <a:t>Students[]</a:t>
-            </a:r>
-            <a:endParaRPr lang="en-US" sz="1372" dirty="0"/>
-          </a:p>
-        </p:txBody>
-      </p:sp>
-      <p:sp>
-        <p:nvSpPr>
-          <p:cNvPr id="7" name="TextBox 6"/>
-          <p:cNvSpPr txBox="1"/>
-          <p:nvPr/>
-        </p:nvSpPr>
-        <p:spPr>
-          <a:xfrm>
-            <a:off x="119555" y="1627265"/>
-            <a:ext cx="3384709" cy="303481"/>
-          </a:xfrm>
-          <a:prstGeom prst="rect">
-            <a:avLst/>
-          </a:prstGeom>
-          <a:noFill/>
-        </p:spPr>
-        <p:txBody>
-          <a:bodyPr wrap="none" rtlCol="0">
-            <a:spAutoFit/>
-          </a:bodyPr>
-          <a:lstStyle/>
-          <a:p>
-            <a:r>
-              <a:rPr lang="en-US" sz="1372" dirty="0" smtClean="0"/>
-              <a:t>// A component with a list of student as data</a:t>
-            </a:r>
-            <a:endParaRPr lang="en-US" sz="1372" dirty="0"/>
-          </a:p>
-        </p:txBody>
-      </p:sp>
-      <p:sp>
-        <p:nvSpPr>
-          <p:cNvPr id="8" name="TextBox 7"/>
-          <p:cNvSpPr txBox="1"/>
-          <p:nvPr/>
-        </p:nvSpPr>
-        <p:spPr>
-          <a:xfrm>
-            <a:off x="1009380" y="2556074"/>
-            <a:ext cx="639919" cy="303481"/>
-          </a:xfrm>
-          <a:prstGeom prst="rect">
-            <a:avLst/>
-          </a:prstGeom>
-          <a:noFill/>
-        </p:spPr>
-        <p:txBody>
-          <a:bodyPr wrap="none" rtlCol="0">
-            <a:spAutoFit/>
-          </a:bodyPr>
-          <a:lstStyle/>
-          <a:p>
-            <a:r>
-              <a:rPr lang="en-US" sz="1372" b="1" i="1" dirty="0">
+              <a:rPr lang="en-US" b="1" i="1" dirty="0">
                 <a:solidFill>
                   <a:srgbClr val="FF0000"/>
                 </a:solidFill>
@@ -3395,25 +3298,29 @@
       </p:sp>
       <p:sp>
         <p:nvSpPr>
-          <p:cNvPr id="9" name="Rounded Rectangle 8"/>
+          <p:cNvPr id="15" name="Arrow: Right 14">
+            <a:extLst>
+              <a:ext uri="{FF2B5EF4-FFF2-40B4-BE49-F238E27FC236}">
+                <a16:creationId xmlns:a16="http://schemas.microsoft.com/office/drawing/2014/main" id="{BDE79897-A322-4B13-9B45-06AE2A7A9ADB}"/>
+              </a:ext>
+            </a:extLst>
+          </p:cNvPr>
           <p:cNvSpPr/>
           <p:nvPr/>
         </p:nvSpPr>
         <p:spPr>
           <a:xfrm>
-            <a:off x="523323" y="2385493"/>
-            <a:ext cx="1650319" cy="1166483"/>
-          </a:xfrm>
-          <a:prstGeom prst="roundRect">
+            <a:off x="3256720" y="1146528"/>
+            <a:ext cx="943143" cy="402470"/>
+          </a:xfrm>
+          <a:prstGeom prst="rightArrow">
             <a:avLst/>
           </a:prstGeom>
-          <a:noFill/>
-          <a:ln>
-            <a:solidFill>
-              <a:srgbClr val="FF0000"/>
-            </a:solidFill>
-            <a:prstDash val="lgDash"/>
-          </a:ln>
+          <a:solidFill>
+            <a:schemeClr val="accent2">
+              <a:lumMod val="75000"/>
+            </a:schemeClr>
+          </a:solidFill>
         </p:spPr>
         <p:style>
           <a:lnRef idx="2">
@@ -3436,20 +3343,26 @@
           <a:lstStyle/>
           <a:p>
             <a:pPr algn="ctr"/>
-            <a:endParaRPr lang="en-US" sz="1372"/>
-          </a:p>
-        </p:txBody>
-      </p:sp>
-      <p:sp>
-        <p:nvSpPr>
-          <p:cNvPr id="10" name="TextBox 9"/>
+            <a:endParaRPr lang="en-US"/>
+          </a:p>
+        </p:txBody>
+      </p:sp>
+      <p:sp>
+        <p:nvSpPr>
+          <p:cNvPr id="16" name="TextBox 15">
+            <a:extLst>
+              <a:ext uri="{FF2B5EF4-FFF2-40B4-BE49-F238E27FC236}">
+                <a16:creationId xmlns:a16="http://schemas.microsoft.com/office/drawing/2014/main" id="{A2AF4A49-E8E7-4B93-A713-5BBCC2C8845D}"/>
+              </a:ext>
+            </a:extLst>
+          </p:cNvPr>
           <p:cNvSpPr txBox="1"/>
           <p:nvPr/>
         </p:nvSpPr>
         <p:spPr>
           <a:xfrm>
-            <a:off x="885053" y="2968734"/>
-            <a:ext cx="926857" cy="303481"/>
+            <a:off x="1739725" y="1548998"/>
+            <a:ext cx="943143" cy="303481"/>
           </a:xfrm>
           <a:prstGeom prst="rect">
             <a:avLst/>
@@ -3463,23 +3376,32 @@
           <a:lstStyle/>
           <a:p>
             <a:r>
-              <a:rPr lang="en-US" sz="1372" dirty="0" smtClean="0"/>
-              <a:t>Students[]</a:t>
-            </a:r>
-            <a:endParaRPr lang="en-US" sz="1372" dirty="0"/>
-          </a:p>
-        </p:txBody>
-      </p:sp>
-      <p:sp>
-        <p:nvSpPr>
-          <p:cNvPr id="11" name="TextBox 10"/>
+              <a:rPr lang="en-US" sz="1372" dirty="0" err="1"/>
+              <a:t>Userdata</a:t>
+            </a:r>
+            <a:r>
+              <a:rPr lang="en-US" sz="1372" dirty="0"/>
+              <a:t>{}</a:t>
+            </a:r>
+          </a:p>
+        </p:txBody>
+      </p:sp>
+      <p:sp>
+        <p:nvSpPr>
+          <p:cNvPr id="17" name="TextBox 16">
+            <a:extLst>
+              <a:ext uri="{FF2B5EF4-FFF2-40B4-BE49-F238E27FC236}">
+                <a16:creationId xmlns:a16="http://schemas.microsoft.com/office/drawing/2014/main" id="{0A5B486D-926B-4258-9285-0996A2D2E079}"/>
+              </a:ext>
+            </a:extLst>
+          </p:cNvPr>
           <p:cNvSpPr txBox="1"/>
           <p:nvPr/>
         </p:nvSpPr>
         <p:spPr>
           <a:xfrm>
-            <a:off x="464251" y="3703715"/>
-            <a:ext cx="2183996" cy="303481"/>
+            <a:off x="3493280" y="920970"/>
+            <a:ext cx="838756" cy="303481"/>
           </a:xfrm>
           <a:prstGeom prst="rect">
             <a:avLst/>
@@ -3493,47 +3415,32 @@
           <a:lstStyle/>
           <a:p>
             <a:r>
-              <a:rPr lang="en-US" sz="1372" dirty="0" smtClean="0"/>
-              <a:t>// </a:t>
-            </a:r>
-            <a:r>
-              <a:rPr lang="en-US" sz="1372" dirty="0" smtClean="0">
+              <a:rPr lang="en-US" sz="1372" b="1" dirty="0">
                 <a:solidFill>
-                  <a:srgbClr val="FF0000"/>
+                  <a:schemeClr val="accent4"/>
                 </a:solidFill>
               </a:rPr>
-              <a:t>app</a:t>
-            </a:r>
-            <a:r>
-              <a:rPr lang="en-US" sz="1372" dirty="0" smtClean="0"/>
-              <a:t> send student to </a:t>
-            </a:r>
-            <a:r>
-              <a:rPr lang="en-US" sz="1372" dirty="0" smtClean="0">
-                <a:solidFill>
-                  <a:srgbClr val="FF0000"/>
-                </a:solidFill>
-              </a:rPr>
-              <a:t>card </a:t>
-            </a:r>
-            <a:endParaRPr lang="en-US" sz="1372" dirty="0">
-              <a:solidFill>
-                <a:srgbClr val="FF0000"/>
-              </a:solidFill>
-            </a:endParaRPr>
-          </a:p>
-        </p:txBody>
-      </p:sp>
-      <p:sp>
-        <p:nvSpPr>
-          <p:cNvPr id="12" name="TextBox 11"/>
+              <a:t>PROVIDE</a:t>
+            </a:r>
+          </a:p>
+        </p:txBody>
+      </p:sp>
+      <p:sp>
+        <p:nvSpPr>
+          <p:cNvPr id="18" name="TextBox 17">
+            <a:extLst>
+              <a:ext uri="{FF2B5EF4-FFF2-40B4-BE49-F238E27FC236}">
+                <a16:creationId xmlns:a16="http://schemas.microsoft.com/office/drawing/2014/main" id="{E344E5E7-B7EF-4358-BCF4-9A3D76C662A1}"/>
+              </a:ext>
+            </a:extLst>
+          </p:cNvPr>
           <p:cNvSpPr txBox="1"/>
           <p:nvPr/>
         </p:nvSpPr>
         <p:spPr>
           <a:xfrm>
-            <a:off x="1009380" y="4803105"/>
-            <a:ext cx="848309" cy="303481"/>
+            <a:off x="3449493" y="1540357"/>
+            <a:ext cx="943143" cy="303481"/>
           </a:xfrm>
           <a:prstGeom prst="rect">
             <a:avLst/>
@@ -3547,31 +3454,75 @@
           <a:lstStyle/>
           <a:p>
             <a:r>
-              <a:rPr lang="en-US" sz="1372" b="1" i="1" dirty="0" smtClean="0">
-                <a:solidFill>
-                  <a:srgbClr val="FF0000"/>
-                </a:solidFill>
-              </a:rPr>
-              <a:t>&lt;parent&gt;</a:t>
-            </a:r>
-            <a:endParaRPr lang="en-US" sz="1372" b="1" i="1" dirty="0">
-              <a:solidFill>
-                <a:srgbClr val="FF0000"/>
-              </a:solidFill>
-            </a:endParaRPr>
-          </a:p>
-        </p:txBody>
-      </p:sp>
-      <p:sp>
-        <p:nvSpPr>
-          <p:cNvPr id="13" name="Rounded Rectangle 12"/>
+              <a:rPr lang="en-US" sz="1372" dirty="0" err="1"/>
+              <a:t>Userdata</a:t>
+            </a:r>
+            <a:r>
+              <a:rPr lang="en-US" sz="1372" dirty="0"/>
+              <a:t>{}</a:t>
+            </a:r>
+          </a:p>
+        </p:txBody>
+      </p:sp>
+      <p:sp>
+        <p:nvSpPr>
+          <p:cNvPr id="19" name="TextBox 18">
+            <a:extLst>
+              <a:ext uri="{FF2B5EF4-FFF2-40B4-BE49-F238E27FC236}">
+                <a16:creationId xmlns:a16="http://schemas.microsoft.com/office/drawing/2014/main" id="{B2034686-EC16-4047-A24A-1635E6F91326}"/>
+              </a:ext>
+            </a:extLst>
+          </p:cNvPr>
+          <p:cNvSpPr txBox="1"/>
+          <p:nvPr/>
+        </p:nvSpPr>
+        <p:spPr>
+          <a:xfrm>
+            <a:off x="711038" y="2108394"/>
+            <a:ext cx="3460691" cy="303481"/>
+          </a:xfrm>
+          <a:prstGeom prst="rect">
+            <a:avLst/>
+          </a:prstGeom>
+          <a:noFill/>
+        </p:spPr>
+        <p:txBody>
+          <a:bodyPr wrap="none" rtlCol="0">
+            <a:spAutoFit/>
+          </a:bodyPr>
+          <a:lstStyle/>
+          <a:p>
+            <a:r>
+              <a:rPr lang="en-US" sz="1372" dirty="0"/>
+              <a:t>// A component with a list of </a:t>
+            </a:r>
+            <a:r>
+              <a:rPr lang="en-US" sz="1372" dirty="0" err="1"/>
+              <a:t>userdata</a:t>
+            </a:r>
+            <a:r>
+              <a:rPr lang="en-US" sz="1372" dirty="0"/>
+              <a:t> as data</a:t>
+            </a:r>
+          </a:p>
+        </p:txBody>
+      </p:sp>
+      <p:sp>
+        <p:nvSpPr>
+          <p:cNvPr id="20" name="Rounded Rectangle 48">
+            <a:extLst>
+              <a:ext uri="{FF2B5EF4-FFF2-40B4-BE49-F238E27FC236}">
+                <a16:creationId xmlns:a16="http://schemas.microsoft.com/office/drawing/2014/main" id="{F929FD7B-8551-46F1-9725-DA7EC39D5475}"/>
+              </a:ext>
+            </a:extLst>
+          </p:cNvPr>
           <p:cNvSpPr/>
           <p:nvPr/>
         </p:nvSpPr>
         <p:spPr>
           <a:xfrm>
-            <a:off x="523323" y="4632524"/>
-            <a:ext cx="1650319" cy="1166483"/>
+            <a:off x="5343032" y="2832141"/>
+            <a:ext cx="2479143" cy="780394"/>
           </a:xfrm>
           <a:prstGeom prst="roundRect">
             <a:avLst/>
@@ -3579,7 +3530,7 @@
           <a:noFill/>
           <a:ln>
             <a:solidFill>
-              <a:srgbClr val="FF0000"/>
+              <a:srgbClr val="7030A0"/>
             </a:solidFill>
             <a:prstDash val="lgDash"/>
           </a:ln>
@@ -3611,14 +3562,20 @@
       </p:sp>
       <p:sp>
         <p:nvSpPr>
-          <p:cNvPr id="14" name="TextBox 13"/>
+          <p:cNvPr id="21" name="TextBox 20">
+            <a:extLst>
+              <a:ext uri="{FF2B5EF4-FFF2-40B4-BE49-F238E27FC236}">
+                <a16:creationId xmlns:a16="http://schemas.microsoft.com/office/drawing/2014/main" id="{777DA157-52B5-46C3-BD27-ECE36B87A1A9}"/>
+              </a:ext>
+            </a:extLst>
+          </p:cNvPr>
           <p:cNvSpPr txBox="1"/>
           <p:nvPr/>
         </p:nvSpPr>
         <p:spPr>
           <a:xfrm>
-            <a:off x="885053" y="5215765"/>
-            <a:ext cx="926857" cy="303481"/>
+            <a:off x="5924407" y="3070597"/>
+            <a:ext cx="1215717" cy="303481"/>
           </a:xfrm>
           <a:prstGeom prst="rect">
             <a:avLst/>
@@ -3632,77 +3589,32 @@
           <a:lstStyle/>
           <a:p>
             <a:r>
-              <a:rPr lang="en-US" sz="1372" dirty="0" smtClean="0"/>
-              <a:t>Students[]</a:t>
-            </a:r>
-            <a:endParaRPr lang="en-US" sz="1372" dirty="0"/>
-          </a:p>
-        </p:txBody>
-      </p:sp>
-      <p:sp>
-        <p:nvSpPr>
-          <p:cNvPr id="15" name="TextBox 14"/>
-          <p:cNvSpPr txBox="1"/>
-          <p:nvPr/>
-        </p:nvSpPr>
-        <p:spPr>
-          <a:xfrm>
-            <a:off x="394083" y="6064417"/>
-            <a:ext cx="3216522" cy="303481"/>
-          </a:xfrm>
-          <a:prstGeom prst="rect">
-            <a:avLst/>
-          </a:prstGeom>
-          <a:noFill/>
-        </p:spPr>
-        <p:txBody>
-          <a:bodyPr wrap="none" rtlCol="0">
-            <a:spAutoFit/>
-          </a:bodyPr>
-          <a:lstStyle/>
-          <a:p>
-            <a:r>
-              <a:rPr lang="en-US" sz="1372" dirty="0" smtClean="0"/>
-              <a:t>// </a:t>
-            </a:r>
-            <a:r>
-              <a:rPr lang="en-US" sz="1372" dirty="0" smtClean="0">
+              <a:rPr lang="en-US" sz="1372" b="1" i="1" dirty="0">
                 <a:solidFill>
-                  <a:srgbClr val="FF0000"/>
+                  <a:srgbClr val="7030A0"/>
                 </a:solidFill>
               </a:rPr>
-              <a:t>from</a:t>
-            </a:r>
-            <a:r>
-              <a:rPr lang="en-US" sz="1372" dirty="0" smtClean="0"/>
-              <a:t> send the event validated to </a:t>
-            </a:r>
-            <a:r>
-              <a:rPr lang="en-US" sz="1372" dirty="0" smtClean="0">
-                <a:solidFill>
-                  <a:srgbClr val="FF0000"/>
-                </a:solidFill>
-              </a:rPr>
-              <a:t>parent</a:t>
-            </a:r>
-            <a:endParaRPr lang="en-US" sz="1372" dirty="0">
-              <a:solidFill>
-                <a:srgbClr val="FF0000"/>
-              </a:solidFill>
-            </a:endParaRPr>
-          </a:p>
-        </p:txBody>
-      </p:sp>
-      <p:sp>
-        <p:nvSpPr>
-          <p:cNvPr id="17" name="Rounded Rectangle 16"/>
+              <a:t>&lt;router-view&gt;</a:t>
+            </a:r>
+          </a:p>
+        </p:txBody>
+      </p:sp>
+      <p:sp>
+        <p:nvSpPr>
+          <p:cNvPr id="22" name="Rounded Rectangle 4">
+            <a:extLst>
+              <a:ext uri="{FF2B5EF4-FFF2-40B4-BE49-F238E27FC236}">
+                <a16:creationId xmlns:a16="http://schemas.microsoft.com/office/drawing/2014/main" id="{FDEFD29D-A7AF-4F98-9830-E99E9FBFADAF}"/>
+              </a:ext>
+            </a:extLst>
+          </p:cNvPr>
           <p:cNvSpPr/>
           <p:nvPr/>
         </p:nvSpPr>
         <p:spPr>
           <a:xfrm>
-            <a:off x="3056973" y="2408786"/>
-            <a:ext cx="1650319" cy="1166483"/>
+            <a:off x="1075379" y="4141646"/>
+            <a:ext cx="2498173" cy="931510"/>
           </a:xfrm>
           <a:prstGeom prst="roundRect">
             <a:avLst/>
@@ -3742,14 +3654,20 @@
       </p:sp>
       <p:sp>
         <p:nvSpPr>
-          <p:cNvPr id="18" name="TextBox 17"/>
+          <p:cNvPr id="23" name="TextBox 22">
+            <a:extLst>
+              <a:ext uri="{FF2B5EF4-FFF2-40B4-BE49-F238E27FC236}">
+                <a16:creationId xmlns:a16="http://schemas.microsoft.com/office/drawing/2014/main" id="{E3B08202-6770-4C05-B31D-7CDC95BE6858}"/>
+              </a:ext>
+            </a:extLst>
+          </p:cNvPr>
           <p:cNvSpPr txBox="1"/>
           <p:nvPr/>
         </p:nvSpPr>
         <p:spPr>
           <a:xfrm>
-            <a:off x="3418703" y="2992027"/>
-            <a:ext cx="926857" cy="303481"/>
+            <a:off x="1935423" y="4206792"/>
+            <a:ext cx="984565" cy="369332"/>
           </a:xfrm>
           <a:prstGeom prst="rect">
             <a:avLst/>
@@ -3763,72 +3681,41 @@
           <a:lstStyle/>
           <a:p>
             <a:r>
-              <a:rPr lang="en-US" sz="1372" dirty="0" smtClean="0"/>
-              <a:t>Students[]</a:t>
-            </a:r>
-            <a:endParaRPr lang="en-US" sz="1372" dirty="0"/>
-          </a:p>
-        </p:txBody>
-      </p:sp>
-      <p:sp>
-        <p:nvSpPr>
-          <p:cNvPr id="19" name="TextBox 18"/>
-          <p:cNvSpPr txBox="1"/>
-          <p:nvPr/>
-        </p:nvSpPr>
-        <p:spPr>
-          <a:xfrm>
-            <a:off x="3666083" y="4779442"/>
-            <a:ext cx="713657" cy="303481"/>
-          </a:xfrm>
-          <a:prstGeom prst="rect">
-            <a:avLst/>
-          </a:prstGeom>
-          <a:noFill/>
-        </p:spPr>
-        <p:txBody>
-          <a:bodyPr wrap="none" rtlCol="0">
-            <a:spAutoFit/>
-          </a:bodyPr>
-          <a:lstStyle/>
-          <a:p>
-            <a:r>
-              <a:rPr lang="en-US" sz="1372" b="1" i="1" dirty="0" smtClean="0">
+              <a:rPr lang="en-US" b="1" i="1" dirty="0">
                 <a:solidFill>
                   <a:srgbClr val="FF0000"/>
                 </a:solidFill>
               </a:rPr>
-              <a:t>&lt;from&gt;</a:t>
-            </a:r>
-            <a:endParaRPr lang="en-US" sz="1372" b="1" i="1" dirty="0">
-              <a:solidFill>
-                <a:srgbClr val="FF0000"/>
-              </a:solidFill>
-            </a:endParaRPr>
-          </a:p>
-        </p:txBody>
-      </p:sp>
-      <p:sp>
-        <p:nvSpPr>
-          <p:cNvPr id="20" name="Rounded Rectangle 19"/>
+              <a:t>&lt;signin&gt;</a:t>
+            </a:r>
+          </a:p>
+        </p:txBody>
+      </p:sp>
+      <p:sp>
+        <p:nvSpPr>
+          <p:cNvPr id="24" name="Arrow: Right 23">
+            <a:extLst>
+              <a:ext uri="{FF2B5EF4-FFF2-40B4-BE49-F238E27FC236}">
+                <a16:creationId xmlns:a16="http://schemas.microsoft.com/office/drawing/2014/main" id="{85EF929D-E604-46DD-ADC3-FA85B85E358A}"/>
+              </a:ext>
+            </a:extLst>
+          </p:cNvPr>
           <p:cNvSpPr/>
           <p:nvPr/>
         </p:nvSpPr>
         <p:spPr>
           <a:xfrm>
-            <a:off x="3180026" y="4608861"/>
-            <a:ext cx="1650319" cy="1166483"/>
-          </a:xfrm>
-          <a:prstGeom prst="roundRect">
+            <a:off x="380102" y="4401014"/>
+            <a:ext cx="984565" cy="402470"/>
+          </a:xfrm>
+          <a:prstGeom prst="rightArrow">
             <a:avLst/>
           </a:prstGeom>
-          <a:noFill/>
-          <a:ln>
-            <a:solidFill>
-              <a:srgbClr val="FF0000"/>
-            </a:solidFill>
-            <a:prstDash val="lgDash"/>
-          </a:ln>
+          <a:solidFill>
+            <a:schemeClr val="accent2">
+              <a:lumMod val="75000"/>
+            </a:schemeClr>
+          </a:solidFill>
         </p:spPr>
         <p:style>
           <a:lnRef idx="2">
@@ -3851,20 +3738,26 @@
           <a:lstStyle/>
           <a:p>
             <a:pPr algn="ctr"/>
-            <a:endParaRPr lang="en-US" sz="1372"/>
-          </a:p>
-        </p:txBody>
-      </p:sp>
-      <p:sp>
-        <p:nvSpPr>
-          <p:cNvPr id="21" name="TextBox 20"/>
+            <a:endParaRPr lang="en-US"/>
+          </a:p>
+        </p:txBody>
+      </p:sp>
+      <p:sp>
+        <p:nvSpPr>
+          <p:cNvPr id="25" name="TextBox 24">
+            <a:extLst>
+              <a:ext uri="{FF2B5EF4-FFF2-40B4-BE49-F238E27FC236}">
+                <a16:creationId xmlns:a16="http://schemas.microsoft.com/office/drawing/2014/main" id="{B15466E2-E3C5-4A98-B938-1C47AB0711AE}"/>
+              </a:ext>
+            </a:extLst>
+          </p:cNvPr>
           <p:cNvSpPr txBox="1"/>
           <p:nvPr/>
         </p:nvSpPr>
         <p:spPr>
           <a:xfrm>
-            <a:off x="3541756" y="5192102"/>
-            <a:ext cx="926857" cy="303481"/>
+            <a:off x="286400" y="4192283"/>
+            <a:ext cx="668645" cy="303481"/>
           </a:xfrm>
           <a:prstGeom prst="rect">
             <a:avLst/>
@@ -3878,30 +3771,261 @@
           <a:lstStyle/>
           <a:p>
             <a:r>
-              <a:rPr lang="en-US" sz="1372" dirty="0" smtClean="0"/>
-              <a:t>Students[]</a:t>
-            </a:r>
-            <a:endParaRPr lang="en-US" sz="1372" dirty="0"/>
-          </a:p>
-        </p:txBody>
-      </p:sp>
-      <p:sp>
-        <p:nvSpPr>
-          <p:cNvPr id="22" name="Right Arrow 21"/>
+              <a:rPr lang="en-US" sz="1372" b="1" dirty="0">
+                <a:solidFill>
+                  <a:schemeClr val="accent4"/>
+                </a:solidFill>
+              </a:rPr>
+              <a:t>INJECT</a:t>
+            </a:r>
+          </a:p>
+        </p:txBody>
+      </p:sp>
+      <p:sp>
+        <p:nvSpPr>
+          <p:cNvPr id="26" name="TextBox 25">
+            <a:extLst>
+              <a:ext uri="{FF2B5EF4-FFF2-40B4-BE49-F238E27FC236}">
+                <a16:creationId xmlns:a16="http://schemas.microsoft.com/office/drawing/2014/main" id="{324786F4-DD83-4C1C-BC79-CC1069A94D22}"/>
+              </a:ext>
+            </a:extLst>
+          </p:cNvPr>
+          <p:cNvSpPr txBox="1"/>
+          <p:nvPr/>
+        </p:nvSpPr>
+        <p:spPr>
+          <a:xfrm>
+            <a:off x="7350604" y="4921415"/>
+            <a:ext cx="943143" cy="303481"/>
+          </a:xfrm>
+          <a:prstGeom prst="rect">
+            <a:avLst/>
+          </a:prstGeom>
+          <a:noFill/>
+        </p:spPr>
+        <p:txBody>
+          <a:bodyPr wrap="none" rtlCol="0">
+            <a:spAutoFit/>
+          </a:bodyPr>
+          <a:lstStyle/>
+          <a:p>
+            <a:r>
+              <a:rPr lang="en-US" sz="1372" dirty="0" err="1"/>
+              <a:t>Userdata</a:t>
+            </a:r>
+            <a:r>
+              <a:rPr lang="en-US" sz="1372" dirty="0"/>
+              <a:t>{}</a:t>
+            </a:r>
+          </a:p>
+        </p:txBody>
+      </p:sp>
+      <p:sp>
+        <p:nvSpPr>
+          <p:cNvPr id="27" name="TextBox 26">
+            <a:extLst>
+              <a:ext uri="{FF2B5EF4-FFF2-40B4-BE49-F238E27FC236}">
+                <a16:creationId xmlns:a16="http://schemas.microsoft.com/office/drawing/2014/main" id="{385BB1C5-3B53-43A3-A964-84C1A74F0CFB}"/>
+              </a:ext>
+            </a:extLst>
+          </p:cNvPr>
+          <p:cNvSpPr txBox="1"/>
+          <p:nvPr/>
+        </p:nvSpPr>
+        <p:spPr>
+          <a:xfrm>
+            <a:off x="170576" y="4803484"/>
+            <a:ext cx="943143" cy="303481"/>
+          </a:xfrm>
+          <a:prstGeom prst="rect">
+            <a:avLst/>
+          </a:prstGeom>
+          <a:noFill/>
+        </p:spPr>
+        <p:txBody>
+          <a:bodyPr wrap="square" rtlCol="0">
+            <a:spAutoFit/>
+          </a:bodyPr>
+          <a:lstStyle/>
+          <a:p>
+            <a:r>
+              <a:rPr lang="en-US" sz="1372" dirty="0" err="1"/>
+              <a:t>Userdata</a:t>
+            </a:r>
+            <a:r>
+              <a:rPr lang="en-US" sz="1372" dirty="0"/>
+              <a:t>{}</a:t>
+            </a:r>
+          </a:p>
+        </p:txBody>
+      </p:sp>
+      <p:sp>
+        <p:nvSpPr>
+          <p:cNvPr id="28" name="TextBox 27">
+            <a:extLst>
+              <a:ext uri="{FF2B5EF4-FFF2-40B4-BE49-F238E27FC236}">
+                <a16:creationId xmlns:a16="http://schemas.microsoft.com/office/drawing/2014/main" id="{B6D03545-0079-4917-97C6-57A4264EA62C}"/>
+              </a:ext>
+            </a:extLst>
+          </p:cNvPr>
+          <p:cNvSpPr txBox="1"/>
+          <p:nvPr/>
+        </p:nvSpPr>
+        <p:spPr>
+          <a:xfrm>
+            <a:off x="392204" y="5484917"/>
+            <a:ext cx="2978123" cy="303481"/>
+          </a:xfrm>
+          <a:prstGeom prst="rect">
+            <a:avLst/>
+          </a:prstGeom>
+          <a:noFill/>
+        </p:spPr>
+        <p:txBody>
+          <a:bodyPr wrap="none" rtlCol="0">
+            <a:spAutoFit/>
+          </a:bodyPr>
+          <a:lstStyle/>
+          <a:p>
+            <a:r>
+              <a:rPr lang="en-US" sz="1372" dirty="0"/>
+              <a:t>// </a:t>
+            </a:r>
+            <a:r>
+              <a:rPr lang="en-US" sz="1372" dirty="0">
+                <a:solidFill>
+                  <a:srgbClr val="FF0000"/>
+                </a:solidFill>
+              </a:rPr>
+              <a:t>signin </a:t>
+            </a:r>
+            <a:r>
+              <a:rPr lang="en-US" sz="1372" dirty="0"/>
+              <a:t> gets </a:t>
+            </a:r>
+            <a:r>
+              <a:rPr lang="en-US" sz="1372" dirty="0" err="1"/>
+              <a:t>userdata</a:t>
+            </a:r>
+            <a:r>
+              <a:rPr lang="en-US" sz="1372" dirty="0"/>
+              <a:t> from a provider</a:t>
+            </a:r>
+            <a:endParaRPr lang="en-US" sz="1372" dirty="0">
+              <a:solidFill>
+                <a:srgbClr val="FF0000"/>
+              </a:solidFill>
+            </a:endParaRPr>
+          </a:p>
+        </p:txBody>
+      </p:sp>
+      <p:cxnSp>
+        <p:nvCxnSpPr>
+          <p:cNvPr id="30" name="Straight Arrow Connector 29">
+            <a:extLst>
+              <a:ext uri="{FF2B5EF4-FFF2-40B4-BE49-F238E27FC236}">
+                <a16:creationId xmlns:a16="http://schemas.microsoft.com/office/drawing/2014/main" id="{CE947D54-4B7B-4DA4-AE6D-A0961B4B2C6B}"/>
+              </a:ext>
+            </a:extLst>
+          </p:cNvPr>
+          <p:cNvCxnSpPr>
+            <a:cxnSpLocks/>
+          </p:cNvCxnSpPr>
+          <p:nvPr/>
+        </p:nvCxnSpPr>
+        <p:spPr>
+          <a:xfrm flipH="1">
+            <a:off x="3531705" y="3612535"/>
+            <a:ext cx="1811327" cy="833591"/>
+          </a:xfrm>
+          <a:prstGeom prst="straightConnector1">
+            <a:avLst/>
+          </a:prstGeom>
+          <a:ln>
+            <a:tailEnd type="triangle"/>
+          </a:ln>
+        </p:spPr>
+        <p:style>
+          <a:lnRef idx="1">
+            <a:schemeClr val="accent1"/>
+          </a:lnRef>
+          <a:fillRef idx="0">
+            <a:schemeClr val="accent1"/>
+          </a:fillRef>
+          <a:effectRef idx="0">
+            <a:schemeClr val="accent1"/>
+          </a:effectRef>
+          <a:fontRef idx="minor">
+            <a:schemeClr val="tx1"/>
+          </a:fontRef>
+        </p:style>
+      </p:cxnSp>
+      <p:cxnSp>
+        <p:nvCxnSpPr>
+          <p:cNvPr id="32" name="Straight Arrow Connector 31">
+            <a:extLst>
+              <a:ext uri="{FF2B5EF4-FFF2-40B4-BE49-F238E27FC236}">
+                <a16:creationId xmlns:a16="http://schemas.microsoft.com/office/drawing/2014/main" id="{6F245D69-03E4-4F3D-924D-73B791C4A6D8}"/>
+              </a:ext>
+            </a:extLst>
+          </p:cNvPr>
+          <p:cNvCxnSpPr/>
+          <p:nvPr/>
+        </p:nvCxnSpPr>
+        <p:spPr>
+          <a:xfrm>
+            <a:off x="7104152" y="3667456"/>
+            <a:ext cx="595361" cy="676567"/>
+          </a:xfrm>
+          <a:prstGeom prst="straightConnector1">
+            <a:avLst/>
+          </a:prstGeom>
+          <a:ln>
+            <a:tailEnd type="triangle"/>
+          </a:ln>
+        </p:spPr>
+        <p:style>
+          <a:lnRef idx="1">
+            <a:schemeClr val="accent1"/>
+          </a:lnRef>
+          <a:fillRef idx="0">
+            <a:schemeClr val="accent1"/>
+          </a:fillRef>
+          <a:effectRef idx="0">
+            <a:schemeClr val="accent1"/>
+          </a:effectRef>
+          <a:fontRef idx="minor">
+            <a:schemeClr val="tx1"/>
+          </a:fontRef>
+        </p:style>
+      </p:cxnSp>
+      <p:sp>
+        <p:nvSpPr>
+          <p:cNvPr id="33" name="Rounded Rectangle 4">
+            <a:extLst>
+              <a:ext uri="{FF2B5EF4-FFF2-40B4-BE49-F238E27FC236}">
+                <a16:creationId xmlns:a16="http://schemas.microsoft.com/office/drawing/2014/main" id="{13575288-DB65-47D8-88C2-FA1D3743D8B3}"/>
+              </a:ext>
+            </a:extLst>
+          </p:cNvPr>
           <p:cNvSpPr/>
           <p:nvPr/>
         </p:nvSpPr>
         <p:spPr>
           <a:xfrm>
-            <a:off x="2197551" y="2768367"/>
-            <a:ext cx="696809" cy="333683"/>
-          </a:xfrm>
-          <a:prstGeom prst="rightArrow">
+            <a:off x="6502633" y="4401014"/>
+            <a:ext cx="2498173" cy="931510"/>
+          </a:xfrm>
+          <a:prstGeom prst="roundRect">
             <a:avLst/>
           </a:prstGeom>
-          <a:solidFill>
-            <a:schemeClr val="accent6"/>
-          </a:solidFill>
+          <a:noFill/>
+          <a:ln>
+            <a:solidFill>
+              <a:srgbClr val="FF0000"/>
+            </a:solidFill>
+            <a:prstDash val="lgDash"/>
+          </a:ln>
         </p:spPr>
         <p:style>
           <a:lnRef idx="2">
@@ -3920,12 +4044,7 @@
           </a:fontRef>
         </p:style>
         <p:txBody>
-          <a:bodyPr rot="0" spcFirstLastPara="0" vertOverflow="overflow" horzOverflow="overflow" vert="horz" wrap="square" lIns="69681" tIns="34840" rIns="69681" bIns="34840" numCol="1" spcCol="0" rtlCol="0" fromWordArt="0" anchor="ctr" anchorCtr="0" forceAA="0" compatLnSpc="1">
-            <a:prstTxWarp prst="textNoShape">
-              <a:avLst/>
-            </a:prstTxWarp>
-            <a:noAutofit/>
-          </a:bodyPr>
+          <a:bodyPr rtlCol="0" anchor="ctr"/>
           <a:lstStyle/>
           <a:p>
             <a:pPr algn="ctr"/>
@@ -3935,14 +4054,20 @@
       </p:sp>
       <p:sp>
         <p:nvSpPr>
-          <p:cNvPr id="23" name="TextBox 22"/>
+          <p:cNvPr id="34" name="TextBox 33">
+            <a:extLst>
+              <a:ext uri="{FF2B5EF4-FFF2-40B4-BE49-F238E27FC236}">
+                <a16:creationId xmlns:a16="http://schemas.microsoft.com/office/drawing/2014/main" id="{3E1006F6-8B08-4689-B8A4-38D47E080F02}"/>
+              </a:ext>
+            </a:extLst>
+          </p:cNvPr>
           <p:cNvSpPr txBox="1"/>
           <p:nvPr/>
         </p:nvSpPr>
         <p:spPr>
           <a:xfrm>
-            <a:off x="2156606" y="3120474"/>
-            <a:ext cx="735714" cy="303481"/>
+            <a:off x="7324337" y="4558340"/>
+            <a:ext cx="1050288" cy="369332"/>
           </a:xfrm>
           <a:prstGeom prst="rect">
             <a:avLst/>
@@ -3956,23 +4081,32 @@
           <a:lstStyle/>
           <a:p>
             <a:r>
-              <a:rPr lang="en-US" sz="1372" dirty="0" smtClean="0"/>
-              <a:t>student</a:t>
-            </a:r>
-            <a:endParaRPr lang="en-US" sz="1372" dirty="0"/>
-          </a:p>
-        </p:txBody>
-      </p:sp>
-      <p:sp>
-        <p:nvSpPr>
-          <p:cNvPr id="24" name="TextBox 23"/>
+              <a:rPr lang="en-US" b="1" i="1" dirty="0">
+                <a:solidFill>
+                  <a:srgbClr val="FF0000"/>
+                </a:solidFill>
+              </a:rPr>
+              <a:t>&lt;signup&gt;</a:t>
+            </a:r>
+          </a:p>
+        </p:txBody>
+      </p:sp>
+      <p:sp>
+        <p:nvSpPr>
+          <p:cNvPr id="35" name="TextBox 34">
+            <a:extLst>
+              <a:ext uri="{FF2B5EF4-FFF2-40B4-BE49-F238E27FC236}">
+                <a16:creationId xmlns:a16="http://schemas.microsoft.com/office/drawing/2014/main" id="{B3883BA7-D851-4279-9912-4AFA5D0C714A}"/>
+              </a:ext>
+            </a:extLst>
+          </p:cNvPr>
           <p:cNvSpPr txBox="1"/>
           <p:nvPr/>
         </p:nvSpPr>
         <p:spPr>
           <a:xfrm>
-            <a:off x="2188492" y="2550268"/>
-            <a:ext cx="670248" cy="303481"/>
+            <a:off x="6360419" y="5570272"/>
+            <a:ext cx="2462662" cy="303481"/>
           </a:xfrm>
           <a:prstGeom prst="rect">
             <a:avLst/>
@@ -3986,68 +4120,68 @@
           <a:lstStyle/>
           <a:p>
             <a:r>
-              <a:rPr lang="en-US" sz="1372" b="1" dirty="0" smtClean="0">
-                <a:solidFill>
-                  <a:schemeClr val="accent6"/>
-                </a:solidFill>
-              </a:rPr>
-              <a:t>PROPS</a:t>
-            </a:r>
-            <a:endParaRPr lang="en-US" sz="1372" b="1" dirty="0">
-              <a:solidFill>
-                <a:schemeClr val="accent6"/>
-              </a:solidFill>
-            </a:endParaRPr>
-          </a:p>
-        </p:txBody>
-      </p:sp>
-      <p:sp>
-        <p:nvSpPr>
-          <p:cNvPr id="25" name="TextBox 24"/>
-          <p:cNvSpPr txBox="1"/>
-          <p:nvPr/>
-        </p:nvSpPr>
-        <p:spPr>
-          <a:xfrm>
-            <a:off x="3562171" y="2587817"/>
-            <a:ext cx="680251" cy="303481"/>
-          </a:xfrm>
-          <a:prstGeom prst="rect">
-            <a:avLst/>
-          </a:prstGeom>
-          <a:noFill/>
-        </p:spPr>
-        <p:txBody>
-          <a:bodyPr wrap="none" rtlCol="0">
-            <a:spAutoFit/>
-          </a:bodyPr>
-          <a:lstStyle/>
-          <a:p>
-            <a:r>
-              <a:rPr lang="en-US" sz="1372" b="1" i="1" dirty="0" smtClean="0">
+              <a:rPr lang="en-US" sz="1372" dirty="0"/>
+              <a:t>// </a:t>
+            </a:r>
+            <a:r>
+              <a:rPr lang="en-US" sz="1372" dirty="0">
                 <a:solidFill>
                   <a:srgbClr val="FF0000"/>
                 </a:solidFill>
               </a:rPr>
-              <a:t>&lt;card&gt;</a:t>
-            </a:r>
-            <a:endParaRPr lang="en-US" sz="1372" b="1" i="1" dirty="0">
-              <a:solidFill>
-                <a:srgbClr val="FF0000"/>
-              </a:solidFill>
-            </a:endParaRPr>
-          </a:p>
-        </p:txBody>
-      </p:sp>
-      <p:sp>
-        <p:nvSpPr>
-          <p:cNvPr id="26" name="Right Arrow 25"/>
+              <a:t>signup </a:t>
+            </a:r>
+            <a:r>
+              <a:rPr lang="en-US" sz="1372" dirty="0">
+                <a:solidFill>
+                  <a:schemeClr val="tx1">
+                    <a:lumMod val="75000"/>
+                    <a:lumOff val="25000"/>
+                  </a:schemeClr>
+                </a:solidFill>
+              </a:rPr>
+              <a:t>send </a:t>
+            </a:r>
+            <a:r>
+              <a:rPr lang="en-US" sz="1372" dirty="0" err="1">
+                <a:solidFill>
+                  <a:schemeClr val="tx1">
+                    <a:lumMod val="75000"/>
+                    <a:lumOff val="25000"/>
+                  </a:schemeClr>
+                </a:solidFill>
+              </a:rPr>
+              <a:t>userdata</a:t>
+            </a:r>
+            <a:r>
+              <a:rPr lang="en-US" sz="1372" dirty="0">
+                <a:solidFill>
+                  <a:schemeClr val="tx1">
+                    <a:lumMod val="75000"/>
+                    <a:lumOff val="25000"/>
+                  </a:schemeClr>
+                </a:solidFill>
+              </a:rPr>
+              <a:t> to app  </a:t>
+            </a:r>
+          </a:p>
+        </p:txBody>
+      </p:sp>
+      <p:sp>
+        <p:nvSpPr>
+          <p:cNvPr id="36" name="Right Arrow 25">
+            <a:extLst>
+              <a:ext uri="{FF2B5EF4-FFF2-40B4-BE49-F238E27FC236}">
+                <a16:creationId xmlns:a16="http://schemas.microsoft.com/office/drawing/2014/main" id="{7962EE39-A1FD-48C5-BD1F-391AD3AC07F3}"/>
+              </a:ext>
+            </a:extLst>
+          </p:cNvPr>
           <p:cNvSpPr/>
           <p:nvPr/>
         </p:nvSpPr>
         <p:spPr>
-          <a:xfrm flipH="1">
-            <a:off x="2387600" y="5000637"/>
+          <a:xfrm rot="10800000" flipH="1">
+            <a:off x="8917685" y="4644408"/>
             <a:ext cx="792424" cy="400041"/>
           </a:xfrm>
           <a:prstGeom prst="rightArrow">
@@ -4089,14 +4223,20 @@
       </p:sp>
       <p:sp>
         <p:nvSpPr>
-          <p:cNvPr id="27" name="TextBox 26"/>
+          <p:cNvPr id="37" name="TextBox 36">
+            <a:extLst>
+              <a:ext uri="{FF2B5EF4-FFF2-40B4-BE49-F238E27FC236}">
+                <a16:creationId xmlns:a16="http://schemas.microsoft.com/office/drawing/2014/main" id="{393C40CB-E8F8-4038-89DC-BF5CBDE03BF9}"/>
+              </a:ext>
+            </a:extLst>
+          </p:cNvPr>
           <p:cNvSpPr txBox="1"/>
           <p:nvPr/>
         </p:nvSpPr>
         <p:spPr>
           <a:xfrm>
-            <a:off x="2523616" y="5336639"/>
-            <a:ext cx="701474" cy="303481"/>
+            <a:off x="9122059" y="4344023"/>
+            <a:ext cx="558166" cy="303481"/>
           </a:xfrm>
           <a:prstGeom prst="rect">
             <a:avLst/>
@@ -4110,91 +4250,32 @@
           <a:lstStyle/>
           <a:p>
             <a:r>
-              <a:rPr lang="en-US" sz="1372" dirty="0" err="1" smtClean="0"/>
-              <a:t>valided</a:t>
-            </a:r>
-            <a:endParaRPr lang="en-US" sz="1372" dirty="0"/>
-          </a:p>
-        </p:txBody>
-      </p:sp>
-      <p:sp>
-        <p:nvSpPr>
-          <p:cNvPr id="28" name="TextBox 27"/>
-          <p:cNvSpPr txBox="1"/>
-          <p:nvPr/>
-        </p:nvSpPr>
-        <p:spPr>
-          <a:xfrm>
-            <a:off x="2574806" y="4621286"/>
-            <a:ext cx="558166" cy="303481"/>
-          </a:xfrm>
-          <a:prstGeom prst="rect">
-            <a:avLst/>
-          </a:prstGeom>
-          <a:noFill/>
-        </p:spPr>
-        <p:txBody>
-          <a:bodyPr wrap="none" rtlCol="0">
-            <a:spAutoFit/>
-          </a:bodyPr>
-          <a:lstStyle/>
-          <a:p>
-            <a:r>
-              <a:rPr lang="en-US" sz="1372" b="1" dirty="0" smtClean="0">
+              <a:rPr lang="en-US" sz="1372" b="1" dirty="0">
                 <a:solidFill>
                   <a:srgbClr val="FF0000"/>
                 </a:solidFill>
               </a:rPr>
               <a:t>EMIT</a:t>
             </a:r>
-            <a:endParaRPr lang="en-US" sz="1372" b="1" dirty="0">
-              <a:solidFill>
-                <a:srgbClr val="FF0000"/>
-              </a:solidFill>
-            </a:endParaRPr>
-          </a:p>
-        </p:txBody>
-      </p:sp>
-      <p:cxnSp>
-        <p:nvCxnSpPr>
-          <p:cNvPr id="30" name="Straight Connector 29"/>
-          <p:cNvCxnSpPr/>
-          <p:nvPr/>
-        </p:nvCxnSpPr>
-        <p:spPr>
-          <a:xfrm>
-            <a:off x="5733143" y="0"/>
-            <a:ext cx="29028" cy="6858000"/>
-          </a:xfrm>
-          <a:prstGeom prst="line">
-            <a:avLst/>
-          </a:prstGeom>
-        </p:spPr>
-        <p:style>
-          <a:lnRef idx="1">
-            <a:schemeClr val="accent1"/>
-          </a:lnRef>
-          <a:fillRef idx="0">
-            <a:schemeClr val="accent1"/>
-          </a:fillRef>
-          <a:effectRef idx="0">
-            <a:schemeClr val="accent1"/>
-          </a:effectRef>
-          <a:fontRef idx="minor">
-            <a:schemeClr val="tx1"/>
-          </a:fontRef>
-        </p:style>
-      </p:cxnSp>
-      <p:sp>
-        <p:nvSpPr>
-          <p:cNvPr id="31" name="TextBox 30"/>
+          </a:p>
+        </p:txBody>
+      </p:sp>
+      <p:sp>
+        <p:nvSpPr>
+          <p:cNvPr id="38" name="TextBox 37">
+            <a:extLst>
+              <a:ext uri="{FF2B5EF4-FFF2-40B4-BE49-F238E27FC236}">
+                <a16:creationId xmlns:a16="http://schemas.microsoft.com/office/drawing/2014/main" id="{CB648951-448A-431F-BFC3-6C1EC5194FC2}"/>
+              </a:ext>
+            </a:extLst>
+          </p:cNvPr>
           <p:cNvSpPr txBox="1"/>
           <p:nvPr/>
         </p:nvSpPr>
         <p:spPr>
-          <a:xfrm>
-            <a:off x="6720447" y="481416"/>
-            <a:ext cx="639919" cy="303481"/>
+          <a:xfrm flipH="1">
+            <a:off x="8982904" y="5041354"/>
+            <a:ext cx="1121923" cy="303481"/>
           </a:xfrm>
           <a:prstGeom prst="rect">
             <a:avLst/>
@@ -4202,32 +4283,38 @@
           <a:noFill/>
         </p:spPr>
         <p:txBody>
-          <a:bodyPr wrap="none" rtlCol="0">
+          <a:bodyPr wrap="square" rtlCol="0">
             <a:spAutoFit/>
           </a:bodyPr>
           <a:lstStyle/>
           <a:p>
             <a:r>
-              <a:rPr lang="en-US" sz="1372" b="1" i="1" dirty="0">
-                <a:solidFill>
-                  <a:srgbClr val="FF0000"/>
-                </a:solidFill>
-              </a:rPr>
-              <a:t>&lt;app&gt;</a:t>
-            </a:r>
-          </a:p>
-        </p:txBody>
-      </p:sp>
-      <p:sp>
-        <p:nvSpPr>
-          <p:cNvPr id="32" name="Rounded Rectangle 31"/>
+              <a:rPr lang="en-US" sz="1372" dirty="0" err="1"/>
+              <a:t>Userdata</a:t>
+            </a:r>
+            <a:r>
+              <a:rPr lang="en-US" sz="1372" dirty="0"/>
+              <a:t>{}</a:t>
+            </a:r>
+          </a:p>
+        </p:txBody>
+      </p:sp>
+      <p:sp>
+        <p:nvSpPr>
+          <p:cNvPr id="39" name="Rounded Rectangle 4">
+            <a:extLst>
+              <a:ext uri="{FF2B5EF4-FFF2-40B4-BE49-F238E27FC236}">
+                <a16:creationId xmlns:a16="http://schemas.microsoft.com/office/drawing/2014/main" id="{2EC85C87-C776-4E58-A3F0-D3C320F87C67}"/>
+              </a:ext>
+            </a:extLst>
+          </p:cNvPr>
           <p:cNvSpPr/>
           <p:nvPr/>
         </p:nvSpPr>
         <p:spPr>
           <a:xfrm>
-            <a:off x="6234390" y="310835"/>
-            <a:ext cx="1650319" cy="1166483"/>
+            <a:off x="1033531" y="1073370"/>
+            <a:ext cx="2498173" cy="931510"/>
           </a:xfrm>
           <a:prstGeom prst="roundRect">
             <a:avLst/>
@@ -4267,14 +4354,20 @@
       </p:sp>
       <p:sp>
         <p:nvSpPr>
-          <p:cNvPr id="33" name="TextBox 32"/>
+          <p:cNvPr id="42" name="TextBox 41">
+            <a:extLst>
+              <a:ext uri="{FF2B5EF4-FFF2-40B4-BE49-F238E27FC236}">
+                <a16:creationId xmlns:a16="http://schemas.microsoft.com/office/drawing/2014/main" id="{618E316A-5E4A-49F4-B33C-45C072AB1A8B}"/>
+              </a:ext>
+            </a:extLst>
+          </p:cNvPr>
           <p:cNvSpPr txBox="1"/>
           <p:nvPr/>
         </p:nvSpPr>
         <p:spPr>
           <a:xfrm>
-            <a:off x="6596120" y="894076"/>
-            <a:ext cx="926857" cy="303481"/>
+            <a:off x="5877050" y="1299275"/>
+            <a:ext cx="1714700" cy="369332"/>
           </a:xfrm>
           <a:prstGeom prst="rect">
             <a:avLst/>
@@ -4288,116 +4381,73 @@
           <a:lstStyle/>
           <a:p>
             <a:r>
-              <a:rPr lang="en-US" sz="1372" dirty="0" smtClean="0"/>
-              <a:t>Students[]</a:t>
-            </a:r>
-            <a:endParaRPr lang="en-US" sz="1372" dirty="0"/>
-          </a:p>
-        </p:txBody>
-      </p:sp>
-      <p:sp>
-        <p:nvSpPr>
-          <p:cNvPr id="34" name="TextBox 33"/>
-          <p:cNvSpPr txBox="1"/>
-          <p:nvPr/>
-        </p:nvSpPr>
-        <p:spPr>
-          <a:xfrm>
-            <a:off x="6234390" y="1613780"/>
-            <a:ext cx="2858411" cy="303481"/>
-          </a:xfrm>
-          <a:prstGeom prst="rect">
-            <a:avLst/>
-          </a:prstGeom>
-          <a:noFill/>
-        </p:spPr>
-        <p:txBody>
-          <a:bodyPr wrap="none" rtlCol="0">
-            <a:spAutoFit/>
-          </a:bodyPr>
-          <a:lstStyle/>
-          <a:p>
-            <a:r>
-              <a:rPr lang="en-US" sz="1372" dirty="0" smtClean="0"/>
-              <a:t>// </a:t>
-            </a:r>
-            <a:r>
-              <a:rPr lang="en-US" sz="1372" dirty="0" smtClean="0">
+              <a:rPr lang="en-US" b="1" i="1" dirty="0">
                 <a:solidFill>
                   <a:srgbClr val="FF0000"/>
                 </a:solidFill>
               </a:rPr>
-              <a:t>app</a:t>
-            </a:r>
-            <a:r>
-              <a:rPr lang="en-US" sz="1372" dirty="0" smtClean="0"/>
-              <a:t>  provides students to anymore</a:t>
-            </a:r>
-            <a:endParaRPr lang="en-US" sz="1372" dirty="0">
-              <a:solidFill>
-                <a:srgbClr val="FF0000"/>
-              </a:solidFill>
-            </a:endParaRPr>
-          </a:p>
-        </p:txBody>
-      </p:sp>
-      <p:sp>
-        <p:nvSpPr>
-          <p:cNvPr id="35" name="Rounded Rectangle 34"/>
-          <p:cNvSpPr/>
+              <a:t>&lt;signin/signup&gt;</a:t>
+            </a:r>
+          </a:p>
+        </p:txBody>
+      </p:sp>
+      <p:cxnSp>
+        <p:nvCxnSpPr>
+          <p:cNvPr id="44" name="Straight Arrow Connector 43">
+            <a:extLst>
+              <a:ext uri="{FF2B5EF4-FFF2-40B4-BE49-F238E27FC236}">
+                <a16:creationId xmlns:a16="http://schemas.microsoft.com/office/drawing/2014/main" id="{399688D5-FD82-4C73-9821-A63E4590521A}"/>
+              </a:ext>
+            </a:extLst>
+          </p:cNvPr>
+          <p:cNvCxnSpPr>
+            <a:stCxn id="13" idx="2"/>
+          </p:cNvCxnSpPr>
           <p:nvPr/>
-        </p:nvSpPr>
-        <p:spPr>
-          <a:xfrm>
-            <a:off x="9792269" y="2129025"/>
-            <a:ext cx="1650319" cy="1166483"/>
-          </a:xfrm>
-          <a:prstGeom prst="roundRect">
+        </p:nvCxnSpPr>
+        <p:spPr>
+          <a:xfrm flipH="1">
+            <a:off x="6592118" y="2014753"/>
+            <a:ext cx="1" cy="701943"/>
+          </a:xfrm>
+          <a:prstGeom prst="straightConnector1">
             <a:avLst/>
           </a:prstGeom>
-          <a:noFill/>
           <a:ln>
-            <a:solidFill>
-              <a:srgbClr val="FF0000"/>
-            </a:solidFill>
-            <a:prstDash val="lgDash"/>
+            <a:tailEnd type="triangle"/>
           </a:ln>
         </p:spPr>
         <p:style>
-          <a:lnRef idx="2">
-            <a:schemeClr val="accent1">
-              <a:shade val="50000"/>
-            </a:schemeClr>
+          <a:lnRef idx="1">
+            <a:schemeClr val="accent1"/>
           </a:lnRef>
-          <a:fillRef idx="1">
+          <a:fillRef idx="0">
             <a:schemeClr val="accent1"/>
           </a:fillRef>
           <a:effectRef idx="0">
             <a:schemeClr val="accent1"/>
           </a:effectRef>
           <a:fontRef idx="minor">
-            <a:schemeClr val="lt1"/>
+            <a:schemeClr val="tx1"/>
           </a:fontRef>
         </p:style>
-        <p:txBody>
-          <a:bodyPr rtlCol="0" anchor="ctr"/>
-          <a:lstStyle/>
-          <a:p>
-            <a:pPr algn="ctr"/>
-            <a:endParaRPr lang="en-US" sz="1372"/>
-          </a:p>
-        </p:txBody>
-      </p:sp>
-      <p:sp>
-        <p:nvSpPr>
-          <p:cNvPr id="36" name="TextBox 35"/>
+      </p:cxnSp>
+      <p:sp>
+        <p:nvSpPr>
+          <p:cNvPr id="45" name="TextBox 44">
+            <a:extLst>
+              <a:ext uri="{FF2B5EF4-FFF2-40B4-BE49-F238E27FC236}">
+                <a16:creationId xmlns:a16="http://schemas.microsoft.com/office/drawing/2014/main" id="{4E7D3F56-95BA-4613-A598-6C90872D6B66}"/>
+              </a:ext>
+            </a:extLst>
+          </p:cNvPr>
           <p:cNvSpPr txBox="1"/>
           <p:nvPr/>
         </p:nvSpPr>
         <p:spPr>
           <a:xfrm>
-            <a:off x="10153999" y="2712266"/>
-            <a:ext cx="926857" cy="303481"/>
+            <a:off x="6206132" y="1600830"/>
+            <a:ext cx="943143" cy="303481"/>
           </a:xfrm>
           <a:prstGeom prst="rect">
             <a:avLst/>
@@ -4411,23 +4461,32 @@
           <a:lstStyle/>
           <a:p>
             <a:r>
-              <a:rPr lang="en-US" sz="1372" dirty="0" smtClean="0"/>
-              <a:t>Students[]</a:t>
-            </a:r>
-            <a:endParaRPr lang="en-US" sz="1372" dirty="0"/>
-          </a:p>
-        </p:txBody>
-      </p:sp>
-      <p:sp>
-        <p:nvSpPr>
-          <p:cNvPr id="40" name="TextBox 39"/>
+              <a:rPr lang="en-US" sz="1372" dirty="0" err="1"/>
+              <a:t>Userdata</a:t>
+            </a:r>
+            <a:r>
+              <a:rPr lang="en-US" sz="1372" dirty="0"/>
+              <a:t>{}</a:t>
+            </a:r>
+          </a:p>
+        </p:txBody>
+      </p:sp>
+      <p:sp>
+        <p:nvSpPr>
+          <p:cNvPr id="46" name="TextBox 45">
+            <a:extLst>
+              <a:ext uri="{FF2B5EF4-FFF2-40B4-BE49-F238E27FC236}">
+                <a16:creationId xmlns:a16="http://schemas.microsoft.com/office/drawing/2014/main" id="{49B6317A-4D16-4E46-970C-9DCDDD6935A4}"/>
+              </a:ext>
+            </a:extLst>
+          </p:cNvPr>
           <p:cNvSpPr txBox="1"/>
           <p:nvPr/>
         </p:nvSpPr>
         <p:spPr>
           <a:xfrm>
-            <a:off x="10297467" y="2308056"/>
-            <a:ext cx="819455" cy="303481"/>
+            <a:off x="8012375" y="1409117"/>
+            <a:ext cx="2811219" cy="303481"/>
           </a:xfrm>
           <a:prstGeom prst="rect">
             <a:avLst/>
@@ -4441,285 +4500,20 @@
           <a:lstStyle/>
           <a:p>
             <a:r>
-              <a:rPr lang="en-US" sz="1372" b="1" i="1" dirty="0" smtClean="0">
+              <a:rPr lang="en-US" sz="1372" dirty="0"/>
+              <a:t>// </a:t>
+            </a:r>
+            <a:r>
+              <a:rPr lang="en-US" sz="1372" dirty="0">
                 <a:solidFill>
                   <a:srgbClr val="FF0000"/>
                 </a:solidFill>
               </a:rPr>
-              <a:t>&lt;dialog&gt;</a:t>
-            </a:r>
-            <a:endParaRPr lang="en-US" sz="1372" b="1" i="1" dirty="0">
-              <a:solidFill>
-                <a:srgbClr val="FF0000"/>
-              </a:solidFill>
-            </a:endParaRPr>
-          </a:p>
-        </p:txBody>
-      </p:sp>
-      <p:sp>
-        <p:nvSpPr>
-          <p:cNvPr id="41" name="Right Arrow 40"/>
-          <p:cNvSpPr/>
-          <p:nvPr/>
-        </p:nvSpPr>
-        <p:spPr>
-          <a:xfrm>
-            <a:off x="7846423" y="727951"/>
-            <a:ext cx="696809" cy="333683"/>
-          </a:xfrm>
-          <a:prstGeom prst="rightArrow">
-            <a:avLst/>
-          </a:prstGeom>
-          <a:solidFill>
-            <a:srgbClr val="FFFF00"/>
-          </a:solidFill>
-        </p:spPr>
-        <p:style>
-          <a:lnRef idx="2">
-            <a:schemeClr val="accent1">
-              <a:shade val="50000"/>
-            </a:schemeClr>
-          </a:lnRef>
-          <a:fillRef idx="1">
-            <a:schemeClr val="accent1"/>
-          </a:fillRef>
-          <a:effectRef idx="0">
-            <a:schemeClr val="accent1"/>
-          </a:effectRef>
-          <a:fontRef idx="minor">
-            <a:schemeClr val="lt1"/>
-          </a:fontRef>
-        </p:style>
-        <p:txBody>
-          <a:bodyPr rot="0" spcFirstLastPara="0" vertOverflow="overflow" horzOverflow="overflow" vert="horz" wrap="square" lIns="69681" tIns="34840" rIns="69681" bIns="34840" numCol="1" spcCol="0" rtlCol="0" fromWordArt="0" anchor="ctr" anchorCtr="0" forceAA="0" compatLnSpc="1">
-            <a:prstTxWarp prst="textNoShape">
-              <a:avLst/>
-            </a:prstTxWarp>
-            <a:noAutofit/>
-          </a:bodyPr>
-          <a:lstStyle/>
-          <a:p>
-            <a:pPr algn="ctr"/>
-            <a:endParaRPr lang="en-US" sz="1372"/>
-          </a:p>
-        </p:txBody>
-      </p:sp>
-      <p:sp>
-        <p:nvSpPr>
-          <p:cNvPr id="42" name="TextBox 41"/>
-          <p:cNvSpPr txBox="1"/>
-          <p:nvPr/>
-        </p:nvSpPr>
-        <p:spPr>
-          <a:xfrm>
-            <a:off x="7837364" y="509852"/>
-            <a:ext cx="838756" cy="303481"/>
-          </a:xfrm>
-          <a:prstGeom prst="rect">
-            <a:avLst/>
-          </a:prstGeom>
-          <a:noFill/>
-        </p:spPr>
-        <p:txBody>
-          <a:bodyPr wrap="none" rtlCol="0">
-            <a:spAutoFit/>
-          </a:bodyPr>
-          <a:lstStyle/>
-          <a:p>
-            <a:r>
-              <a:rPr lang="en-US" sz="1372" b="1" dirty="0">
-                <a:solidFill>
-                  <a:schemeClr val="accent4"/>
-                </a:solidFill>
-              </a:rPr>
-              <a:t>PROVIDE</a:t>
-            </a:r>
-          </a:p>
-        </p:txBody>
-      </p:sp>
-      <p:sp>
-        <p:nvSpPr>
-          <p:cNvPr id="43" name="TextBox 42"/>
-          <p:cNvSpPr txBox="1"/>
-          <p:nvPr/>
-        </p:nvSpPr>
-        <p:spPr>
-          <a:xfrm>
-            <a:off x="7991050" y="1073307"/>
-            <a:ext cx="926857" cy="303481"/>
-          </a:xfrm>
-          <a:prstGeom prst="rect">
-            <a:avLst/>
-          </a:prstGeom>
-          <a:noFill/>
-        </p:spPr>
-        <p:txBody>
-          <a:bodyPr wrap="none" rtlCol="0">
-            <a:spAutoFit/>
-          </a:bodyPr>
-          <a:lstStyle/>
-          <a:p>
-            <a:r>
-              <a:rPr lang="en-US" sz="1372" dirty="0" smtClean="0"/>
-              <a:t>Students[]</a:t>
-            </a:r>
-            <a:endParaRPr lang="en-US" sz="1372" dirty="0"/>
-          </a:p>
-        </p:txBody>
-      </p:sp>
-      <p:sp>
-        <p:nvSpPr>
-          <p:cNvPr id="44" name="Right Arrow 43"/>
-          <p:cNvSpPr/>
-          <p:nvPr/>
-        </p:nvSpPr>
-        <p:spPr>
-          <a:xfrm>
-            <a:off x="9135788" y="2542676"/>
-            <a:ext cx="696809" cy="333683"/>
-          </a:xfrm>
-          <a:prstGeom prst="rightArrow">
-            <a:avLst/>
-          </a:prstGeom>
-          <a:solidFill>
-            <a:srgbClr val="FFFF00"/>
-          </a:solidFill>
-        </p:spPr>
-        <p:style>
-          <a:lnRef idx="2">
-            <a:schemeClr val="accent1">
-              <a:shade val="50000"/>
-            </a:schemeClr>
-          </a:lnRef>
-          <a:fillRef idx="1">
-            <a:schemeClr val="accent1"/>
-          </a:fillRef>
-          <a:effectRef idx="0">
-            <a:schemeClr val="accent1"/>
-          </a:effectRef>
-          <a:fontRef idx="minor">
-            <a:schemeClr val="lt1"/>
-          </a:fontRef>
-        </p:style>
-        <p:txBody>
-          <a:bodyPr rot="0" spcFirstLastPara="0" vertOverflow="overflow" horzOverflow="overflow" vert="horz" wrap="square" lIns="69681" tIns="34840" rIns="69681" bIns="34840" numCol="1" spcCol="0" rtlCol="0" fromWordArt="0" anchor="ctr" anchorCtr="0" forceAA="0" compatLnSpc="1">
-            <a:prstTxWarp prst="textNoShape">
-              <a:avLst/>
-            </a:prstTxWarp>
-            <a:noAutofit/>
-          </a:bodyPr>
-          <a:lstStyle/>
-          <a:p>
-            <a:pPr algn="ctr"/>
-            <a:endParaRPr lang="en-US" sz="1372"/>
-          </a:p>
-        </p:txBody>
-      </p:sp>
-      <p:sp>
-        <p:nvSpPr>
-          <p:cNvPr id="45" name="TextBox 44"/>
-          <p:cNvSpPr txBox="1"/>
-          <p:nvPr/>
-        </p:nvSpPr>
-        <p:spPr>
-          <a:xfrm>
-            <a:off x="9126729" y="2324577"/>
-            <a:ext cx="668645" cy="303481"/>
-          </a:xfrm>
-          <a:prstGeom prst="rect">
-            <a:avLst/>
-          </a:prstGeom>
-          <a:noFill/>
-        </p:spPr>
-        <p:txBody>
-          <a:bodyPr wrap="none" rtlCol="0">
-            <a:spAutoFit/>
-          </a:bodyPr>
-          <a:lstStyle/>
-          <a:p>
-            <a:r>
-              <a:rPr lang="en-US" sz="1372" b="1" dirty="0" smtClean="0">
-                <a:solidFill>
-                  <a:schemeClr val="accent4"/>
-                </a:solidFill>
-              </a:rPr>
-              <a:t>INJECT</a:t>
-            </a:r>
-            <a:endParaRPr lang="en-US" sz="1372" b="1" dirty="0">
-              <a:solidFill>
-                <a:schemeClr val="accent4"/>
-              </a:solidFill>
-            </a:endParaRPr>
-          </a:p>
-        </p:txBody>
-      </p:sp>
-      <p:sp>
-        <p:nvSpPr>
-          <p:cNvPr id="46" name="TextBox 45"/>
-          <p:cNvSpPr txBox="1"/>
-          <p:nvPr/>
-        </p:nvSpPr>
-        <p:spPr>
-          <a:xfrm>
-            <a:off x="9280415" y="2888032"/>
-            <a:ext cx="926857" cy="303481"/>
-          </a:xfrm>
-          <a:prstGeom prst="rect">
-            <a:avLst/>
-          </a:prstGeom>
-          <a:noFill/>
-        </p:spPr>
-        <p:txBody>
-          <a:bodyPr wrap="none" rtlCol="0">
-            <a:spAutoFit/>
-          </a:bodyPr>
-          <a:lstStyle/>
-          <a:p>
-            <a:r>
-              <a:rPr lang="en-US" sz="1372" dirty="0" smtClean="0"/>
-              <a:t>Students[]</a:t>
-            </a:r>
-            <a:endParaRPr lang="en-US" sz="1372" dirty="0"/>
-          </a:p>
-        </p:txBody>
-      </p:sp>
-      <p:sp>
-        <p:nvSpPr>
-          <p:cNvPr id="47" name="TextBox 46"/>
-          <p:cNvSpPr txBox="1"/>
-          <p:nvPr/>
-        </p:nvSpPr>
-        <p:spPr>
-          <a:xfrm>
-            <a:off x="8917907" y="3423528"/>
-            <a:ext cx="2987100" cy="303481"/>
-          </a:xfrm>
-          <a:prstGeom prst="rect">
-            <a:avLst/>
-          </a:prstGeom>
-          <a:noFill/>
-        </p:spPr>
-        <p:txBody>
-          <a:bodyPr wrap="none" rtlCol="0">
-            <a:spAutoFit/>
-          </a:bodyPr>
-          <a:lstStyle/>
-          <a:p>
-            <a:r>
-              <a:rPr lang="en-US" sz="1372" dirty="0" smtClean="0"/>
-              <a:t>// </a:t>
-            </a:r>
-            <a:r>
-              <a:rPr lang="en-US" sz="1372" dirty="0" smtClean="0">
-                <a:solidFill>
-                  <a:srgbClr val="FF0000"/>
-                </a:solidFill>
-              </a:rPr>
-              <a:t>dialog </a:t>
-            </a:r>
-            <a:r>
-              <a:rPr lang="en-US" sz="1372" dirty="0" smtClean="0"/>
-              <a:t> gets students from a provider</a:t>
+              <a:t>signin/signup </a:t>
+            </a:r>
+            <a:r>
+              <a:rPr lang="en-US" sz="1372" dirty="0"/>
+              <a:t> folder signin/signup</a:t>
             </a:r>
             <a:endParaRPr lang="en-US" sz="1372" dirty="0">
               <a:solidFill>
@@ -4729,132 +4523,10 @@
           </a:p>
         </p:txBody>
       </p:sp>
-      <p:sp>
-        <p:nvSpPr>
-          <p:cNvPr id="48" name="TextBox 47"/>
-          <p:cNvSpPr txBox="1"/>
-          <p:nvPr/>
-        </p:nvSpPr>
-        <p:spPr>
-          <a:xfrm>
-            <a:off x="6561502" y="4305380"/>
-            <a:ext cx="1215717" cy="303481"/>
-          </a:xfrm>
-          <a:prstGeom prst="rect">
-            <a:avLst/>
-          </a:prstGeom>
-          <a:noFill/>
-        </p:spPr>
-        <p:txBody>
-          <a:bodyPr wrap="none" rtlCol="0">
-            <a:spAutoFit/>
-          </a:bodyPr>
-          <a:lstStyle/>
-          <a:p>
-            <a:r>
-              <a:rPr lang="en-US" sz="1372" b="1" i="1" dirty="0">
-                <a:solidFill>
-                  <a:srgbClr val="7030A0"/>
-                </a:solidFill>
-              </a:rPr>
-              <a:t>&lt;router-view&gt;</a:t>
-            </a:r>
-          </a:p>
-        </p:txBody>
-      </p:sp>
-      <p:sp>
-        <p:nvSpPr>
-          <p:cNvPr id="49" name="Rounded Rectangle 48"/>
-          <p:cNvSpPr/>
-          <p:nvPr/>
-        </p:nvSpPr>
-        <p:spPr>
-          <a:xfrm>
-            <a:off x="6217868" y="4170157"/>
-            <a:ext cx="1866945" cy="584334"/>
-          </a:xfrm>
-          <a:prstGeom prst="roundRect">
-            <a:avLst/>
-          </a:prstGeom>
-          <a:noFill/>
-          <a:ln>
-            <a:solidFill>
-              <a:srgbClr val="7030A0"/>
-            </a:solidFill>
-            <a:prstDash val="lgDash"/>
-          </a:ln>
-        </p:spPr>
-        <p:style>
-          <a:lnRef idx="2">
-            <a:schemeClr val="accent1">
-              <a:shade val="50000"/>
-            </a:schemeClr>
-          </a:lnRef>
-          <a:fillRef idx="1">
-            <a:schemeClr val="accent1"/>
-          </a:fillRef>
-          <a:effectRef idx="0">
-            <a:schemeClr val="accent1"/>
-          </a:effectRef>
-          <a:fontRef idx="minor">
-            <a:schemeClr val="lt1"/>
-          </a:fontRef>
-        </p:style>
-        <p:txBody>
-          <a:bodyPr rtlCol="0" anchor="ctr"/>
-          <a:lstStyle/>
-          <a:p>
-            <a:pPr algn="ctr"/>
-            <a:endParaRPr lang="en-US" sz="1372"/>
-          </a:p>
-        </p:txBody>
-      </p:sp>
-      <p:sp>
-        <p:nvSpPr>
-          <p:cNvPr id="50" name="TextBox 49"/>
-          <p:cNvSpPr txBox="1"/>
-          <p:nvPr/>
-        </p:nvSpPr>
-        <p:spPr>
-          <a:xfrm>
-            <a:off x="8256742" y="4317805"/>
-            <a:ext cx="2229136" cy="303481"/>
-          </a:xfrm>
-          <a:prstGeom prst="rect">
-            <a:avLst/>
-          </a:prstGeom>
-          <a:noFill/>
-        </p:spPr>
-        <p:txBody>
-          <a:bodyPr wrap="none" rtlCol="0">
-            <a:spAutoFit/>
-          </a:bodyPr>
-          <a:lstStyle/>
-          <a:p>
-            <a:r>
-              <a:rPr lang="en-US" sz="1372" dirty="0" smtClean="0"/>
-              <a:t>// </a:t>
-            </a:r>
-            <a:r>
-              <a:rPr lang="en-US" sz="1372" dirty="0" err="1" smtClean="0"/>
-              <a:t>Vue</a:t>
-            </a:r>
-            <a:r>
-              <a:rPr lang="en-US" sz="1372" dirty="0" smtClean="0"/>
-              <a:t> JS built-in component</a:t>
-            </a:r>
-            <a:endParaRPr lang="en-US" sz="1372" dirty="0">
-              <a:solidFill>
-                <a:srgbClr val="FF0000"/>
-              </a:solidFill>
-            </a:endParaRPr>
-          </a:p>
-        </p:txBody>
-      </p:sp>
     </p:spTree>
     <p:extLst>
       <p:ext uri="{BB962C8B-B14F-4D97-AF65-F5344CB8AC3E}">
-        <p14:creationId xmlns:p14="http://schemas.microsoft.com/office/powerpoint/2010/main" val="3109588190"/>
+        <p14:creationId xmlns:p14="http://schemas.microsoft.com/office/powerpoint/2010/main" val="166220774"/>
       </p:ext>
     </p:extLst>
   </p:cSld>

</xml_diff>